<commit_message>
Work on documenting the threshold estimation test
</commit_message>
<xml_diff>
--- a/illustrations/test-threshold-estimation.pptx
+++ b/illustrations/test-threshold-estimation.pptx
@@ -198,7 +198,7 @@
           <a:p>
             <a:fld id="{E5B862AD-9C40-401D-B25A-EFF016BC1B1D}" type="datetimeFigureOut">
               <a:rPr lang="en-DK" smtClean="0"/>
-              <a:t>27/12/2025</a:t>
+              <a:t>06/01/2026</a:t>
             </a:fld>
             <a:endParaRPr lang="en-DK"/>
           </a:p>
@@ -783,7 +783,7 @@
           <a:p>
             <a:fld id="{1F4D6754-5EC6-489C-99C4-13243F598B17}" type="datetimeFigureOut">
               <a:rPr lang="en-DK" smtClean="0"/>
-              <a:t>27/12/2025</a:t>
+              <a:t>06/01/2026</a:t>
             </a:fld>
             <a:endParaRPr lang="en-DK"/>
           </a:p>
@@ -983,7 +983,7 @@
           <a:p>
             <a:fld id="{1F4D6754-5EC6-489C-99C4-13243F598B17}" type="datetimeFigureOut">
               <a:rPr lang="en-DK" smtClean="0"/>
-              <a:t>27/12/2025</a:t>
+              <a:t>06/01/2026</a:t>
             </a:fld>
             <a:endParaRPr lang="en-DK"/>
           </a:p>
@@ -1193,7 +1193,7 @@
           <a:p>
             <a:fld id="{1F4D6754-5EC6-489C-99C4-13243F598B17}" type="datetimeFigureOut">
               <a:rPr lang="en-DK" smtClean="0"/>
-              <a:t>27/12/2025</a:t>
+              <a:t>06/01/2026</a:t>
             </a:fld>
             <a:endParaRPr lang="en-DK"/>
           </a:p>
@@ -1393,7 +1393,7 @@
           <a:p>
             <a:fld id="{1F4D6754-5EC6-489C-99C4-13243F598B17}" type="datetimeFigureOut">
               <a:rPr lang="en-DK" smtClean="0"/>
-              <a:t>27/12/2025</a:t>
+              <a:t>06/01/2026</a:t>
             </a:fld>
             <a:endParaRPr lang="en-DK"/>
           </a:p>
@@ -1669,7 +1669,7 @@
           <a:p>
             <a:fld id="{1F4D6754-5EC6-489C-99C4-13243F598B17}" type="datetimeFigureOut">
               <a:rPr lang="en-DK" smtClean="0"/>
-              <a:t>27/12/2025</a:t>
+              <a:t>06/01/2026</a:t>
             </a:fld>
             <a:endParaRPr lang="en-DK"/>
           </a:p>
@@ -1937,7 +1937,7 @@
           <a:p>
             <a:fld id="{1F4D6754-5EC6-489C-99C4-13243F598B17}" type="datetimeFigureOut">
               <a:rPr lang="en-DK" smtClean="0"/>
-              <a:t>27/12/2025</a:t>
+              <a:t>06/01/2026</a:t>
             </a:fld>
             <a:endParaRPr lang="en-DK"/>
           </a:p>
@@ -2352,7 +2352,7 @@
           <a:p>
             <a:fld id="{1F4D6754-5EC6-489C-99C4-13243F598B17}" type="datetimeFigureOut">
               <a:rPr lang="en-DK" smtClean="0"/>
-              <a:t>27/12/2025</a:t>
+              <a:t>06/01/2026</a:t>
             </a:fld>
             <a:endParaRPr lang="en-DK"/>
           </a:p>
@@ -2494,7 +2494,7 @@
           <a:p>
             <a:fld id="{1F4D6754-5EC6-489C-99C4-13243F598B17}" type="datetimeFigureOut">
               <a:rPr lang="en-DK" smtClean="0"/>
-              <a:t>27/12/2025</a:t>
+              <a:t>06/01/2026</a:t>
             </a:fld>
             <a:endParaRPr lang="en-DK"/>
           </a:p>
@@ -2607,7 +2607,7 @@
           <a:p>
             <a:fld id="{1F4D6754-5EC6-489C-99C4-13243F598B17}" type="datetimeFigureOut">
               <a:rPr lang="en-DK" smtClean="0"/>
-              <a:t>27/12/2025</a:t>
+              <a:t>06/01/2026</a:t>
             </a:fld>
             <a:endParaRPr lang="en-DK"/>
           </a:p>
@@ -2920,7 +2920,7 @@
           <a:p>
             <a:fld id="{1F4D6754-5EC6-489C-99C4-13243F598B17}" type="datetimeFigureOut">
               <a:rPr lang="en-DK" smtClean="0"/>
-              <a:t>27/12/2025</a:t>
+              <a:t>06/01/2026</a:t>
             </a:fld>
             <a:endParaRPr lang="en-DK"/>
           </a:p>
@@ -3209,7 +3209,7 @@
           <a:p>
             <a:fld id="{1F4D6754-5EC6-489C-99C4-13243F598B17}" type="datetimeFigureOut">
               <a:rPr lang="en-DK" smtClean="0"/>
-              <a:t>27/12/2025</a:t>
+              <a:t>06/01/2026</a:t>
             </a:fld>
             <a:endParaRPr lang="en-DK"/>
           </a:p>
@@ -3452,7 +3452,7 @@
           <a:p>
             <a:fld id="{1F4D6754-5EC6-489C-99C4-13243F598B17}" type="datetimeFigureOut">
               <a:rPr lang="en-DK" smtClean="0"/>
-              <a:t>27/12/2025</a:t>
+              <a:t>06/01/2026</a:t>
             </a:fld>
             <a:endParaRPr lang="en-DK"/>
           </a:p>
@@ -4331,6 +4331,36 @@
           <a:chExt cx="0" cy="0"/>
         </a:xfrm>
       </p:grpSpPr>
+      <p:pic>
+        <p:nvPicPr>
+          <p:cNvPr id="3" name="Picture 2">
+            <a:extLst>
+              <a:ext uri="{FF2B5EF4-FFF2-40B4-BE49-F238E27FC236}">
+                <a16:creationId xmlns:a16="http://schemas.microsoft.com/office/drawing/2014/main" id="{A0E20B21-11BC-7DE1-9EF7-7F32EF0DEEA3}"/>
+              </a:ext>
+            </a:extLst>
+          </p:cNvPr>
+          <p:cNvPicPr>
+            <a:picLocks noChangeAspect="1"/>
+          </p:cNvPicPr>
+          <p:nvPr/>
+        </p:nvPicPr>
+        <p:blipFill>
+          <a:blip r:embed="rId3"/>
+          <a:stretch>
+            <a:fillRect/>
+          </a:stretch>
+        </p:blipFill>
+        <p:spPr>
+          <a:xfrm>
+            <a:off x="3676312" y="1618997"/>
+            <a:ext cx="4839375" cy="3620005"/>
+          </a:xfrm>
+          <a:prstGeom prst="rect">
+            <a:avLst/>
+          </a:prstGeom>
+        </p:spPr>
+      </p:pic>
     </p:spTree>
     <p:extLst>
       <p:ext uri="{BB962C8B-B14F-4D97-AF65-F5344CB8AC3E}">

</xml_diff>

<commit_message>
Work on threshold estimation documentation
</commit_message>
<xml_diff>
--- a/illustrations/test-threshold-estimation.pptx
+++ b/illustrations/test-threshold-estimation.pptx
@@ -3,13 +3,25 @@
 <p:presentation xmlns:a="http://schemas.openxmlformats.org/drawingml/2006/main" xmlns:r="http://schemas.openxmlformats.org/officeDocument/2006/relationships" xmlns:p="http://schemas.openxmlformats.org/presentationml/2006/main" saveSubsetFonts="1">
   <p:sldMasterIdLst>
     <p:sldMasterId id="2147483648" r:id="rId1"/>
+    <p:sldMasterId id="2147483660" r:id="rId2"/>
   </p:sldMasterIdLst>
   <p:notesMasterIdLst>
-    <p:notesMasterId r:id="rId4"/>
+    <p:notesMasterId r:id="rId16"/>
   </p:notesMasterIdLst>
   <p:sldIdLst>
-    <p:sldId id="256" r:id="rId2"/>
-    <p:sldId id="257" r:id="rId3"/>
+    <p:sldId id="256" r:id="rId3"/>
+    <p:sldId id="257" r:id="rId4"/>
+    <p:sldId id="258" r:id="rId5"/>
+    <p:sldId id="259" r:id="rId6"/>
+    <p:sldId id="278" r:id="rId7"/>
+    <p:sldId id="275" r:id="rId8"/>
+    <p:sldId id="272" r:id="rId9"/>
+    <p:sldId id="276" r:id="rId10"/>
+    <p:sldId id="273" r:id="rId11"/>
+    <p:sldId id="277" r:id="rId12"/>
+    <p:sldId id="274" r:id="rId13"/>
+    <p:sldId id="270" r:id="rId14"/>
+    <p:sldId id="271" r:id="rId15"/>
   </p:sldIdLst>
   <p:sldSz cx="12192000" cy="6858000"/>
   <p:notesSz cx="6858000" cy="9144000"/>
@@ -510,7 +522,44 @@
           <a:bodyPr/>
           <a:lstStyle/>
           <a:p>
-            <a:endParaRPr lang="en-DK" dirty="0"/>
+            <a:pPr marL="0" marR="0" lvl="0" indent="0" algn="l" defTabSz="914400" rtl="0" eaLnBrk="1" fontAlgn="auto" latinLnBrk="0" hangingPunct="1">
+              <a:lnSpc>
+                <a:spcPct val="100000"/>
+              </a:lnSpc>
+              <a:spcBef>
+                <a:spcPts val="0"/>
+              </a:spcBef>
+              <a:spcAft>
+                <a:spcPts val="0"/>
+              </a:spcAft>
+              <a:buClrTx/>
+              <a:buSzTx/>
+              <a:buFontTx/>
+              <a:buNone/>
+              <a:tabLst/>
+              <a:defRPr/>
+            </a:pPr>
+            <a:r>
+              <a:rPr lang="en-US" sz="1200" b="0" kern="1200" dirty="0" err="1">
+                <a:solidFill>
+                  <a:schemeClr val="tx1"/>
+                </a:solidFill>
+                <a:effectLst/>
+                <a:latin typeface="+mn-lt"/>
+                <a:ea typeface="+mn-ea"/>
+                <a:cs typeface="+mn-cs"/>
+              </a:rPr>
+              <a:t>ThesholdEstimationUI</a:t>
+            </a:r>
+            <a:endParaRPr lang="en-US" sz="1200" b="0" kern="1200" dirty="0">
+              <a:solidFill>
+                <a:schemeClr val="tx1"/>
+              </a:solidFill>
+              <a:effectLst/>
+              <a:latin typeface="+mn-lt"/>
+              <a:ea typeface="+mn-ea"/>
+              <a:cs typeface="+mn-cs"/>
+            </a:endParaRPr>
           </a:p>
         </p:txBody>
       </p:sp>
@@ -541,6 +590,365 @@
     <p:extLst>
       <p:ext uri="{BB962C8B-B14F-4D97-AF65-F5344CB8AC3E}">
         <p14:creationId xmlns:p14="http://schemas.microsoft.com/office/powerpoint/2010/main" val="1070245353"/>
+      </p:ext>
+    </p:extLst>
+  </p:cSld>
+  <p:clrMapOvr>
+    <a:masterClrMapping/>
+  </p:clrMapOvr>
+</p:notes>
+</file>
+
+<file path=ppt/notesSlides/notesSlide10.xml><?xml version="1.0" encoding="utf-8"?>
+<p:notes xmlns:a="http://schemas.openxmlformats.org/drawingml/2006/main" xmlns:r="http://schemas.openxmlformats.org/officeDocument/2006/relationships" xmlns:p="http://schemas.openxmlformats.org/presentationml/2006/main">
+  <p:cSld>
+    <p:spTree>
+      <p:nvGrpSpPr>
+        <p:cNvPr id="1" name=""/>
+        <p:cNvGrpSpPr/>
+        <p:nvPr/>
+      </p:nvGrpSpPr>
+      <p:grpSpPr>
+        <a:xfrm>
+          <a:off x="0" y="0"/>
+          <a:ext cx="0" cy="0"/>
+          <a:chOff x="0" y="0"/>
+          <a:chExt cx="0" cy="0"/>
+        </a:xfrm>
+      </p:grpSpPr>
+      <p:sp>
+        <p:nvSpPr>
+          <p:cNvPr id="2" name="Slide Image Placeholder 1"/>
+          <p:cNvSpPr>
+            <a:spLocks noGrp="1" noRot="1" noChangeAspect="1"/>
+          </p:cNvSpPr>
+          <p:nvPr>
+            <p:ph type="sldImg"/>
+          </p:nvPr>
+        </p:nvSpPr>
+        <p:spPr/>
+      </p:sp>
+      <p:sp>
+        <p:nvSpPr>
+          <p:cNvPr id="3" name="Notes Placeholder 2"/>
+          <p:cNvSpPr>
+            <a:spLocks noGrp="1"/>
+          </p:cNvSpPr>
+          <p:nvPr>
+            <p:ph type="body" idx="1"/>
+          </p:nvPr>
+        </p:nvSpPr>
+        <p:spPr/>
+        <p:txBody>
+          <a:bodyPr/>
+          <a:lstStyle/>
+          <a:p>
+            <a:r>
+              <a:rPr lang="en-US" dirty="0"/>
+              <a:t>TaskManualNRS.png</a:t>
+            </a:r>
+            <a:endParaRPr lang="en-DK" dirty="0"/>
+          </a:p>
+        </p:txBody>
+      </p:sp>
+      <p:sp>
+        <p:nvSpPr>
+          <p:cNvPr id="4" name="Slide Number Placeholder 3"/>
+          <p:cNvSpPr>
+            <a:spLocks noGrp="1"/>
+          </p:cNvSpPr>
+          <p:nvPr>
+            <p:ph type="sldNum" sz="quarter" idx="5"/>
+          </p:nvPr>
+        </p:nvSpPr>
+        <p:spPr/>
+        <p:txBody>
+          <a:bodyPr/>
+          <a:lstStyle/>
+          <a:p>
+            <a:fld id="{3673C79A-452F-414A-AC94-4E22DAD01198}" type="slidenum">
+              <a:rPr lang="en-DK" smtClean="0"/>
+              <a:t>10</a:t>
+            </a:fld>
+            <a:endParaRPr lang="en-DK"/>
+          </a:p>
+        </p:txBody>
+      </p:sp>
+    </p:spTree>
+    <p:extLst>
+      <p:ext uri="{BB962C8B-B14F-4D97-AF65-F5344CB8AC3E}">
+        <p14:creationId xmlns:p14="http://schemas.microsoft.com/office/powerpoint/2010/main" val="2124829861"/>
+      </p:ext>
+    </p:extLst>
+  </p:cSld>
+  <p:clrMapOvr>
+    <a:masterClrMapping/>
+  </p:clrMapOvr>
+</p:notes>
+</file>
+
+<file path=ppt/notesSlides/notesSlide11.xml><?xml version="1.0" encoding="utf-8"?>
+<p:notes xmlns:a="http://schemas.openxmlformats.org/drawingml/2006/main" xmlns:r="http://schemas.openxmlformats.org/officeDocument/2006/relationships" xmlns:p="http://schemas.openxmlformats.org/presentationml/2006/main">
+  <p:cSld>
+    <p:spTree>
+      <p:nvGrpSpPr>
+        <p:cNvPr id="1" name=""/>
+        <p:cNvGrpSpPr/>
+        <p:nvPr/>
+      </p:nvGrpSpPr>
+      <p:grpSpPr>
+        <a:xfrm>
+          <a:off x="0" y="0"/>
+          <a:ext cx="0" cy="0"/>
+          <a:chOff x="0" y="0"/>
+          <a:chExt cx="0" cy="0"/>
+        </a:xfrm>
+      </p:grpSpPr>
+      <p:sp>
+        <p:nvSpPr>
+          <p:cNvPr id="2" name="Slide Image Placeholder 1"/>
+          <p:cNvSpPr>
+            <a:spLocks noGrp="1" noRot="1" noChangeAspect="1"/>
+          </p:cNvSpPr>
+          <p:nvPr>
+            <p:ph type="sldImg"/>
+          </p:nvPr>
+        </p:nvSpPr>
+        <p:spPr/>
+      </p:sp>
+      <p:sp>
+        <p:nvSpPr>
+          <p:cNvPr id="3" name="Notes Placeholder 2"/>
+          <p:cNvSpPr>
+            <a:spLocks noGrp="1"/>
+          </p:cNvSpPr>
+          <p:nvPr>
+            <p:ph type="body" idx="1"/>
+          </p:nvPr>
+        </p:nvSpPr>
+        <p:spPr/>
+        <p:txBody>
+          <a:bodyPr/>
+          <a:lstStyle/>
+          <a:p>
+            <a:r>
+              <a:rPr lang="en-US" dirty="0" err="1"/>
+              <a:t>TaskVAS</a:t>
+            </a:r>
+            <a:endParaRPr lang="en-DK" dirty="0"/>
+          </a:p>
+        </p:txBody>
+      </p:sp>
+      <p:sp>
+        <p:nvSpPr>
+          <p:cNvPr id="4" name="Slide Number Placeholder 3"/>
+          <p:cNvSpPr>
+            <a:spLocks noGrp="1"/>
+          </p:cNvSpPr>
+          <p:nvPr>
+            <p:ph type="sldNum" sz="quarter" idx="5"/>
+          </p:nvPr>
+        </p:nvSpPr>
+        <p:spPr/>
+        <p:txBody>
+          <a:bodyPr/>
+          <a:lstStyle/>
+          <a:p>
+            <a:fld id="{3673C79A-452F-414A-AC94-4E22DAD01198}" type="slidenum">
+              <a:rPr lang="en-DK" smtClean="0"/>
+              <a:t>11</a:t>
+            </a:fld>
+            <a:endParaRPr lang="en-DK"/>
+          </a:p>
+        </p:txBody>
+      </p:sp>
+    </p:spTree>
+    <p:extLst>
+      <p:ext uri="{BB962C8B-B14F-4D97-AF65-F5344CB8AC3E}">
+        <p14:creationId xmlns:p14="http://schemas.microsoft.com/office/powerpoint/2010/main" val="195837289"/>
+      </p:ext>
+    </p:extLst>
+  </p:cSld>
+  <p:clrMapOvr>
+    <a:masterClrMapping/>
+  </p:clrMapOvr>
+</p:notes>
+</file>
+
+<file path=ppt/notesSlides/notesSlide12.xml><?xml version="1.0" encoding="utf-8"?>
+<p:notes xmlns:a="http://schemas.openxmlformats.org/drawingml/2006/main" xmlns:r="http://schemas.openxmlformats.org/officeDocument/2006/relationships" xmlns:p="http://schemas.openxmlformats.org/presentationml/2006/main">
+  <p:cSld>
+    <p:spTree>
+      <p:nvGrpSpPr>
+        <p:cNvPr id="1" name=""/>
+        <p:cNvGrpSpPr/>
+        <p:nvPr/>
+      </p:nvGrpSpPr>
+      <p:grpSpPr>
+        <a:xfrm>
+          <a:off x="0" y="0"/>
+          <a:ext cx="0" cy="0"/>
+          <a:chOff x="0" y="0"/>
+          <a:chExt cx="0" cy="0"/>
+        </a:xfrm>
+      </p:grpSpPr>
+      <p:sp>
+        <p:nvSpPr>
+          <p:cNvPr id="2" name="Slide Image Placeholder 1"/>
+          <p:cNvSpPr>
+            <a:spLocks noGrp="1" noRot="1" noChangeAspect="1"/>
+          </p:cNvSpPr>
+          <p:nvPr>
+            <p:ph type="sldImg"/>
+          </p:nvPr>
+        </p:nvSpPr>
+        <p:spPr/>
+      </p:sp>
+      <p:sp>
+        <p:nvSpPr>
+          <p:cNvPr id="3" name="Notes Placeholder 2"/>
+          <p:cNvSpPr>
+            <a:spLocks noGrp="1"/>
+          </p:cNvSpPr>
+          <p:nvPr>
+            <p:ph type="body" idx="1"/>
+          </p:nvPr>
+        </p:nvSpPr>
+        <p:spPr/>
+        <p:txBody>
+          <a:bodyPr/>
+          <a:lstStyle/>
+          <a:p>
+            <a:r>
+              <a:rPr lang="en-US" dirty="0" err="1"/>
+              <a:t>TaskAFC</a:t>
+            </a:r>
+            <a:endParaRPr lang="en-DK" dirty="0"/>
+          </a:p>
+        </p:txBody>
+      </p:sp>
+      <p:sp>
+        <p:nvSpPr>
+          <p:cNvPr id="4" name="Slide Number Placeholder 3"/>
+          <p:cNvSpPr>
+            <a:spLocks noGrp="1"/>
+          </p:cNvSpPr>
+          <p:nvPr>
+            <p:ph type="sldNum" sz="quarter" idx="5"/>
+          </p:nvPr>
+        </p:nvSpPr>
+        <p:spPr/>
+        <p:txBody>
+          <a:bodyPr/>
+          <a:lstStyle/>
+          <a:p>
+            <a:fld id="{3673C79A-452F-414A-AC94-4E22DAD01198}" type="slidenum">
+              <a:rPr lang="en-DK" smtClean="0"/>
+              <a:t>12</a:t>
+            </a:fld>
+            <a:endParaRPr lang="en-DK"/>
+          </a:p>
+        </p:txBody>
+      </p:sp>
+    </p:spTree>
+    <p:extLst>
+      <p:ext uri="{BB962C8B-B14F-4D97-AF65-F5344CB8AC3E}">
+        <p14:creationId xmlns:p14="http://schemas.microsoft.com/office/powerpoint/2010/main" val="2466448899"/>
+      </p:ext>
+    </p:extLst>
+  </p:cSld>
+  <p:clrMapOvr>
+    <a:masterClrMapping/>
+  </p:clrMapOvr>
+</p:notes>
+</file>
+
+<file path=ppt/notesSlides/notesSlide13.xml><?xml version="1.0" encoding="utf-8"?>
+<p:notes xmlns:a="http://schemas.openxmlformats.org/drawingml/2006/main" xmlns:r="http://schemas.openxmlformats.org/officeDocument/2006/relationships" xmlns:p="http://schemas.openxmlformats.org/presentationml/2006/main">
+  <p:cSld>
+    <p:spTree>
+      <p:nvGrpSpPr>
+        <p:cNvPr id="1" name=""/>
+        <p:cNvGrpSpPr/>
+        <p:nvPr/>
+      </p:nvGrpSpPr>
+      <p:grpSpPr>
+        <a:xfrm>
+          <a:off x="0" y="0"/>
+          <a:ext cx="0" cy="0"/>
+          <a:chOff x="0" y="0"/>
+          <a:chExt cx="0" cy="0"/>
+        </a:xfrm>
+      </p:grpSpPr>
+      <p:sp>
+        <p:nvSpPr>
+          <p:cNvPr id="2" name="Slide Image Placeholder 1"/>
+          <p:cNvSpPr>
+            <a:spLocks noGrp="1" noRot="1" noChangeAspect="1"/>
+          </p:cNvSpPr>
+          <p:nvPr>
+            <p:ph type="sldImg"/>
+          </p:nvPr>
+        </p:nvSpPr>
+        <p:spPr/>
+      </p:sp>
+      <p:sp>
+        <p:nvSpPr>
+          <p:cNvPr id="3" name="Notes Placeholder 2"/>
+          <p:cNvSpPr>
+            <a:spLocks noGrp="1"/>
+          </p:cNvSpPr>
+          <p:nvPr>
+            <p:ph type="body" idx="1"/>
+          </p:nvPr>
+        </p:nvSpPr>
+        <p:spPr/>
+        <p:txBody>
+          <a:bodyPr/>
+          <a:lstStyle/>
+          <a:p>
+            <a:r>
+              <a:rPr lang="en-US" sz="1200" b="0" kern="1200">
+                <a:solidFill>
+                  <a:schemeClr val="tx1"/>
+                </a:solidFill>
+                <a:effectLst/>
+                <a:latin typeface="+mn-lt"/>
+                <a:ea typeface="+mn-ea"/>
+                <a:cs typeface="+mn-cs"/>
+              </a:rPr>
+              <a:t>TaskIFC</a:t>
+            </a:r>
+          </a:p>
+        </p:txBody>
+      </p:sp>
+      <p:sp>
+        <p:nvSpPr>
+          <p:cNvPr id="4" name="Slide Number Placeholder 3"/>
+          <p:cNvSpPr>
+            <a:spLocks noGrp="1"/>
+          </p:cNvSpPr>
+          <p:nvPr>
+            <p:ph type="sldNum" sz="quarter" idx="5"/>
+          </p:nvPr>
+        </p:nvSpPr>
+        <p:spPr/>
+        <p:txBody>
+          <a:bodyPr/>
+          <a:lstStyle/>
+          <a:p>
+            <a:fld id="{3673C79A-452F-414A-AC94-4E22DAD01198}" type="slidenum">
+              <a:rPr lang="en-DK" smtClean="0"/>
+              <a:t>13</a:t>
+            </a:fld>
+            <a:endParaRPr lang="en-DK"/>
+          </a:p>
+        </p:txBody>
+      </p:sp>
+    </p:spTree>
+    <p:extLst>
+      <p:ext uri="{BB962C8B-B14F-4D97-AF65-F5344CB8AC3E}">
+        <p14:creationId xmlns:p14="http://schemas.microsoft.com/office/powerpoint/2010/main" val="508029497"/>
       </p:ext>
     </p:extLst>
   </p:cSld>
@@ -594,7 +1002,11 @@
           <a:bodyPr/>
           <a:lstStyle/>
           <a:p>
-            <a:endParaRPr lang="en-DK"/>
+            <a:r>
+              <a:rPr lang="en-US" dirty="0"/>
+              <a:t>UpDown.png</a:t>
+            </a:r>
+            <a:endParaRPr lang="en-DK" dirty="0"/>
           </a:p>
         </p:txBody>
       </p:sp>
@@ -625,6 +1037,622 @@
     <p:extLst>
       <p:ext uri="{BB962C8B-B14F-4D97-AF65-F5344CB8AC3E}">
         <p14:creationId xmlns:p14="http://schemas.microsoft.com/office/powerpoint/2010/main" val="2216402312"/>
+      </p:ext>
+    </p:extLst>
+  </p:cSld>
+  <p:clrMapOvr>
+    <a:masterClrMapping/>
+  </p:clrMapOvr>
+</p:notes>
+</file>
+
+<file path=ppt/notesSlides/notesSlide3.xml><?xml version="1.0" encoding="utf-8"?>
+<p:notes xmlns:a="http://schemas.openxmlformats.org/drawingml/2006/main" xmlns:r="http://schemas.openxmlformats.org/officeDocument/2006/relationships" xmlns:p="http://schemas.openxmlformats.org/presentationml/2006/main">
+  <p:cSld>
+    <p:spTree>
+      <p:nvGrpSpPr>
+        <p:cNvPr id="1" name=""/>
+        <p:cNvGrpSpPr/>
+        <p:nvPr/>
+      </p:nvGrpSpPr>
+      <p:grpSpPr>
+        <a:xfrm>
+          <a:off x="0" y="0"/>
+          <a:ext cx="0" cy="0"/>
+          <a:chOff x="0" y="0"/>
+          <a:chExt cx="0" cy="0"/>
+        </a:xfrm>
+      </p:grpSpPr>
+      <p:sp>
+        <p:nvSpPr>
+          <p:cNvPr id="2" name="Slide Image Placeholder 1"/>
+          <p:cNvSpPr>
+            <a:spLocks noGrp="1" noRot="1" noChangeAspect="1"/>
+          </p:cNvSpPr>
+          <p:nvPr>
+            <p:ph type="sldImg"/>
+          </p:nvPr>
+        </p:nvSpPr>
+        <p:spPr/>
+      </p:sp>
+      <p:sp>
+        <p:nvSpPr>
+          <p:cNvPr id="3" name="Notes Placeholder 2"/>
+          <p:cNvSpPr>
+            <a:spLocks noGrp="1"/>
+          </p:cNvSpPr>
+          <p:nvPr>
+            <p:ph type="body" idx="1"/>
+          </p:nvPr>
+        </p:nvSpPr>
+        <p:spPr/>
+        <p:txBody>
+          <a:bodyPr/>
+          <a:lstStyle/>
+          <a:p>
+            <a:r>
+              <a:rPr lang="en-US" dirty="0"/>
+              <a:t>DiscreteUpDown.png</a:t>
+            </a:r>
+            <a:endParaRPr lang="en-DK" dirty="0"/>
+          </a:p>
+        </p:txBody>
+      </p:sp>
+      <p:sp>
+        <p:nvSpPr>
+          <p:cNvPr id="4" name="Slide Number Placeholder 3"/>
+          <p:cNvSpPr>
+            <a:spLocks noGrp="1"/>
+          </p:cNvSpPr>
+          <p:nvPr>
+            <p:ph type="sldNum" sz="quarter" idx="5"/>
+          </p:nvPr>
+        </p:nvSpPr>
+        <p:spPr/>
+        <p:txBody>
+          <a:bodyPr/>
+          <a:lstStyle/>
+          <a:p>
+            <a:fld id="{3673C79A-452F-414A-AC94-4E22DAD01198}" type="slidenum">
+              <a:rPr lang="en-DK" smtClean="0"/>
+              <a:t>3</a:t>
+            </a:fld>
+            <a:endParaRPr lang="en-DK"/>
+          </a:p>
+        </p:txBody>
+      </p:sp>
+    </p:spTree>
+    <p:extLst>
+      <p:ext uri="{BB962C8B-B14F-4D97-AF65-F5344CB8AC3E}">
+        <p14:creationId xmlns:p14="http://schemas.microsoft.com/office/powerpoint/2010/main" val="1283941803"/>
+      </p:ext>
+    </p:extLst>
+  </p:cSld>
+  <p:clrMapOvr>
+    <a:masterClrMapping/>
+  </p:clrMapOvr>
+</p:notes>
+</file>
+
+<file path=ppt/notesSlides/notesSlide4.xml><?xml version="1.0" encoding="utf-8"?>
+<p:notes xmlns:a="http://schemas.openxmlformats.org/drawingml/2006/main" xmlns:r="http://schemas.openxmlformats.org/officeDocument/2006/relationships" xmlns:p="http://schemas.openxmlformats.org/presentationml/2006/main">
+  <p:cSld>
+    <p:spTree>
+      <p:nvGrpSpPr>
+        <p:cNvPr id="1" name=""/>
+        <p:cNvGrpSpPr/>
+        <p:nvPr/>
+      </p:nvGrpSpPr>
+      <p:grpSpPr>
+        <a:xfrm>
+          <a:off x="0" y="0"/>
+          <a:ext cx="0" cy="0"/>
+          <a:chOff x="0" y="0"/>
+          <a:chExt cx="0" cy="0"/>
+        </a:xfrm>
+      </p:grpSpPr>
+      <p:sp>
+        <p:nvSpPr>
+          <p:cNvPr id="2" name="Slide Image Placeholder 1"/>
+          <p:cNvSpPr>
+            <a:spLocks noGrp="1" noRot="1" noChangeAspect="1"/>
+          </p:cNvSpPr>
+          <p:nvPr>
+            <p:ph type="sldImg"/>
+          </p:nvPr>
+        </p:nvSpPr>
+        <p:spPr/>
+      </p:sp>
+      <p:sp>
+        <p:nvSpPr>
+          <p:cNvPr id="3" name="Notes Placeholder 2"/>
+          <p:cNvSpPr>
+            <a:spLocks noGrp="1"/>
+          </p:cNvSpPr>
+          <p:nvPr>
+            <p:ph type="body" idx="1"/>
+          </p:nvPr>
+        </p:nvSpPr>
+        <p:spPr/>
+        <p:txBody>
+          <a:bodyPr/>
+          <a:lstStyle/>
+          <a:p>
+            <a:r>
+              <a:rPr lang="en-US" dirty="0"/>
+              <a:t>PsiMethod.png</a:t>
+            </a:r>
+            <a:endParaRPr lang="en-DK" dirty="0"/>
+          </a:p>
+        </p:txBody>
+      </p:sp>
+      <p:sp>
+        <p:nvSpPr>
+          <p:cNvPr id="4" name="Slide Number Placeholder 3"/>
+          <p:cNvSpPr>
+            <a:spLocks noGrp="1"/>
+          </p:cNvSpPr>
+          <p:nvPr>
+            <p:ph type="sldNum" sz="quarter" idx="5"/>
+          </p:nvPr>
+        </p:nvSpPr>
+        <p:spPr/>
+        <p:txBody>
+          <a:bodyPr/>
+          <a:lstStyle/>
+          <a:p>
+            <a:fld id="{3673C79A-452F-414A-AC94-4E22DAD01198}" type="slidenum">
+              <a:rPr lang="en-DK" smtClean="0"/>
+              <a:t>4</a:t>
+            </a:fld>
+            <a:endParaRPr lang="en-DK"/>
+          </a:p>
+        </p:txBody>
+      </p:sp>
+    </p:spTree>
+    <p:extLst>
+      <p:ext uri="{BB962C8B-B14F-4D97-AF65-F5344CB8AC3E}">
+        <p14:creationId xmlns:p14="http://schemas.microsoft.com/office/powerpoint/2010/main" val="1112665418"/>
+      </p:ext>
+    </p:extLst>
+  </p:cSld>
+  <p:clrMapOvr>
+    <a:masterClrMapping/>
+  </p:clrMapOvr>
+</p:notes>
+</file>
+
+<file path=ppt/notesSlides/notesSlide5.xml><?xml version="1.0" encoding="utf-8"?>
+<p:notes xmlns:a="http://schemas.openxmlformats.org/drawingml/2006/main" xmlns:r="http://schemas.openxmlformats.org/officeDocument/2006/relationships" xmlns:p="http://schemas.openxmlformats.org/presentationml/2006/main">
+  <p:cSld>
+    <p:spTree>
+      <p:nvGrpSpPr>
+        <p:cNvPr id="1" name=""/>
+        <p:cNvGrpSpPr/>
+        <p:nvPr/>
+      </p:nvGrpSpPr>
+      <p:grpSpPr>
+        <a:xfrm>
+          <a:off x="0" y="0"/>
+          <a:ext cx="0" cy="0"/>
+          <a:chOff x="0" y="0"/>
+          <a:chExt cx="0" cy="0"/>
+        </a:xfrm>
+      </p:grpSpPr>
+      <p:sp>
+        <p:nvSpPr>
+          <p:cNvPr id="2" name="Slide Image Placeholder 1"/>
+          <p:cNvSpPr>
+            <a:spLocks noGrp="1" noRot="1" noChangeAspect="1"/>
+          </p:cNvSpPr>
+          <p:nvPr>
+            <p:ph type="sldImg"/>
+          </p:nvPr>
+        </p:nvSpPr>
+        <p:spPr/>
+      </p:sp>
+      <p:sp>
+        <p:nvSpPr>
+          <p:cNvPr id="3" name="Notes Placeholder 2"/>
+          <p:cNvSpPr>
+            <a:spLocks noGrp="1"/>
+          </p:cNvSpPr>
+          <p:nvPr>
+            <p:ph type="body" idx="1"/>
+          </p:nvPr>
+        </p:nvSpPr>
+        <p:spPr/>
+        <p:txBody>
+          <a:bodyPr/>
+          <a:lstStyle/>
+          <a:p>
+            <a:r>
+              <a:rPr lang="en-US" dirty="0"/>
+              <a:t>TaskFYN.png</a:t>
+            </a:r>
+            <a:endParaRPr lang="en-DK" dirty="0"/>
+          </a:p>
+        </p:txBody>
+      </p:sp>
+      <p:sp>
+        <p:nvSpPr>
+          <p:cNvPr id="4" name="Slide Number Placeholder 3"/>
+          <p:cNvSpPr>
+            <a:spLocks noGrp="1"/>
+          </p:cNvSpPr>
+          <p:nvPr>
+            <p:ph type="sldNum" sz="quarter" idx="5"/>
+          </p:nvPr>
+        </p:nvSpPr>
+        <p:spPr/>
+        <p:txBody>
+          <a:bodyPr/>
+          <a:lstStyle/>
+          <a:p>
+            <a:fld id="{3673C79A-452F-414A-AC94-4E22DAD01198}" type="slidenum">
+              <a:rPr lang="en-DK" smtClean="0"/>
+              <a:t>5</a:t>
+            </a:fld>
+            <a:endParaRPr lang="en-DK"/>
+          </a:p>
+        </p:txBody>
+      </p:sp>
+    </p:spTree>
+    <p:extLst>
+      <p:ext uri="{BB962C8B-B14F-4D97-AF65-F5344CB8AC3E}">
+        <p14:creationId xmlns:p14="http://schemas.microsoft.com/office/powerpoint/2010/main" val="622618996"/>
+      </p:ext>
+    </p:extLst>
+  </p:cSld>
+  <p:clrMapOvr>
+    <a:masterClrMapping/>
+  </p:clrMapOvr>
+</p:notes>
+</file>
+
+<file path=ppt/notesSlides/notesSlide6.xml><?xml version="1.0" encoding="utf-8"?>
+<p:notes xmlns:a="http://schemas.openxmlformats.org/drawingml/2006/main" xmlns:r="http://schemas.openxmlformats.org/officeDocument/2006/relationships" xmlns:p="http://schemas.openxmlformats.org/presentationml/2006/main">
+  <p:cSld>
+    <p:spTree>
+      <p:nvGrpSpPr>
+        <p:cNvPr id="1" name=""/>
+        <p:cNvGrpSpPr/>
+        <p:nvPr/>
+      </p:nvGrpSpPr>
+      <p:grpSpPr>
+        <a:xfrm>
+          <a:off x="0" y="0"/>
+          <a:ext cx="0" cy="0"/>
+          <a:chOff x="0" y="0"/>
+          <a:chExt cx="0" cy="0"/>
+        </a:xfrm>
+      </p:grpSpPr>
+      <p:sp>
+        <p:nvSpPr>
+          <p:cNvPr id="2" name="Slide Image Placeholder 1"/>
+          <p:cNvSpPr>
+            <a:spLocks noGrp="1" noRot="1" noChangeAspect="1"/>
+          </p:cNvSpPr>
+          <p:nvPr>
+            <p:ph type="sldImg"/>
+          </p:nvPr>
+        </p:nvSpPr>
+        <p:spPr/>
+      </p:sp>
+      <p:sp>
+        <p:nvSpPr>
+          <p:cNvPr id="3" name="Notes Placeholder 2"/>
+          <p:cNvSpPr>
+            <a:spLocks noGrp="1"/>
+          </p:cNvSpPr>
+          <p:nvPr>
+            <p:ph type="body" idx="1"/>
+          </p:nvPr>
+        </p:nvSpPr>
+        <p:spPr/>
+        <p:txBody>
+          <a:bodyPr/>
+          <a:lstStyle/>
+          <a:p>
+            <a:r>
+              <a:rPr lang="en-US" dirty="0"/>
+              <a:t>TaskManualYesNo.png</a:t>
+            </a:r>
+            <a:endParaRPr lang="en-DK" dirty="0"/>
+          </a:p>
+        </p:txBody>
+      </p:sp>
+      <p:sp>
+        <p:nvSpPr>
+          <p:cNvPr id="4" name="Slide Number Placeholder 3"/>
+          <p:cNvSpPr>
+            <a:spLocks noGrp="1"/>
+          </p:cNvSpPr>
+          <p:nvPr>
+            <p:ph type="sldNum" sz="quarter" idx="5"/>
+          </p:nvPr>
+        </p:nvSpPr>
+        <p:spPr/>
+        <p:txBody>
+          <a:bodyPr/>
+          <a:lstStyle/>
+          <a:p>
+            <a:fld id="{3673C79A-452F-414A-AC94-4E22DAD01198}" type="slidenum">
+              <a:rPr lang="en-DK" smtClean="0"/>
+              <a:t>6</a:t>
+            </a:fld>
+            <a:endParaRPr lang="en-DK"/>
+          </a:p>
+        </p:txBody>
+      </p:sp>
+    </p:spTree>
+    <p:extLst>
+      <p:ext uri="{BB962C8B-B14F-4D97-AF65-F5344CB8AC3E}">
+        <p14:creationId xmlns:p14="http://schemas.microsoft.com/office/powerpoint/2010/main" val="4158607828"/>
+      </p:ext>
+    </p:extLst>
+  </p:cSld>
+  <p:clrMapOvr>
+    <a:masterClrMapping/>
+  </p:clrMapOvr>
+</p:notes>
+</file>
+
+<file path=ppt/notesSlides/notesSlide7.xml><?xml version="1.0" encoding="utf-8"?>
+<p:notes xmlns:a="http://schemas.openxmlformats.org/drawingml/2006/main" xmlns:r="http://schemas.openxmlformats.org/officeDocument/2006/relationships" xmlns:p="http://schemas.openxmlformats.org/presentationml/2006/main">
+  <p:cSld>
+    <p:spTree>
+      <p:nvGrpSpPr>
+        <p:cNvPr id="1" name=""/>
+        <p:cNvGrpSpPr/>
+        <p:nvPr/>
+      </p:nvGrpSpPr>
+      <p:grpSpPr>
+        <a:xfrm>
+          <a:off x="0" y="0"/>
+          <a:ext cx="0" cy="0"/>
+          <a:chOff x="0" y="0"/>
+          <a:chExt cx="0" cy="0"/>
+        </a:xfrm>
+      </p:grpSpPr>
+      <p:sp>
+        <p:nvSpPr>
+          <p:cNvPr id="2" name="Slide Image Placeholder 1"/>
+          <p:cNvSpPr>
+            <a:spLocks noGrp="1" noRot="1" noChangeAspect="1"/>
+          </p:cNvSpPr>
+          <p:nvPr>
+            <p:ph type="sldImg"/>
+          </p:nvPr>
+        </p:nvSpPr>
+        <p:spPr/>
+      </p:sp>
+      <p:sp>
+        <p:nvSpPr>
+          <p:cNvPr id="3" name="Notes Placeholder 2"/>
+          <p:cNvSpPr>
+            <a:spLocks noGrp="1"/>
+          </p:cNvSpPr>
+          <p:nvPr>
+            <p:ph type="body" idx="1"/>
+          </p:nvPr>
+        </p:nvSpPr>
+        <p:spPr/>
+        <p:txBody>
+          <a:bodyPr/>
+          <a:lstStyle/>
+          <a:p>
+            <a:r>
+              <a:rPr lang="en-US" dirty="0"/>
+              <a:t>TaskCRS.png</a:t>
+            </a:r>
+            <a:endParaRPr lang="en-DK" dirty="0"/>
+          </a:p>
+        </p:txBody>
+      </p:sp>
+      <p:sp>
+        <p:nvSpPr>
+          <p:cNvPr id="4" name="Slide Number Placeholder 3"/>
+          <p:cNvSpPr>
+            <a:spLocks noGrp="1"/>
+          </p:cNvSpPr>
+          <p:nvPr>
+            <p:ph type="sldNum" sz="quarter" idx="5"/>
+          </p:nvPr>
+        </p:nvSpPr>
+        <p:spPr/>
+        <p:txBody>
+          <a:bodyPr/>
+          <a:lstStyle/>
+          <a:p>
+            <a:fld id="{3673C79A-452F-414A-AC94-4E22DAD01198}" type="slidenum">
+              <a:rPr lang="en-DK" smtClean="0"/>
+              <a:t>7</a:t>
+            </a:fld>
+            <a:endParaRPr lang="en-DK"/>
+          </a:p>
+        </p:txBody>
+      </p:sp>
+    </p:spTree>
+    <p:extLst>
+      <p:ext uri="{BB962C8B-B14F-4D97-AF65-F5344CB8AC3E}">
+        <p14:creationId xmlns:p14="http://schemas.microsoft.com/office/powerpoint/2010/main" val="1957558626"/>
+      </p:ext>
+    </p:extLst>
+  </p:cSld>
+  <p:clrMapOvr>
+    <a:masterClrMapping/>
+  </p:clrMapOvr>
+</p:notes>
+</file>
+
+<file path=ppt/notesSlides/notesSlide8.xml><?xml version="1.0" encoding="utf-8"?>
+<p:notes xmlns:a="http://schemas.openxmlformats.org/drawingml/2006/main" xmlns:r="http://schemas.openxmlformats.org/officeDocument/2006/relationships" xmlns:p="http://schemas.openxmlformats.org/presentationml/2006/main">
+  <p:cSld>
+    <p:spTree>
+      <p:nvGrpSpPr>
+        <p:cNvPr id="1" name=""/>
+        <p:cNvGrpSpPr/>
+        <p:nvPr/>
+      </p:nvGrpSpPr>
+      <p:grpSpPr>
+        <a:xfrm>
+          <a:off x="0" y="0"/>
+          <a:ext cx="0" cy="0"/>
+          <a:chOff x="0" y="0"/>
+          <a:chExt cx="0" cy="0"/>
+        </a:xfrm>
+      </p:grpSpPr>
+      <p:sp>
+        <p:nvSpPr>
+          <p:cNvPr id="2" name="Slide Image Placeholder 1"/>
+          <p:cNvSpPr>
+            <a:spLocks noGrp="1" noRot="1" noChangeAspect="1"/>
+          </p:cNvSpPr>
+          <p:nvPr>
+            <p:ph type="sldImg"/>
+          </p:nvPr>
+        </p:nvSpPr>
+        <p:spPr/>
+      </p:sp>
+      <p:sp>
+        <p:nvSpPr>
+          <p:cNvPr id="3" name="Notes Placeholder 2"/>
+          <p:cNvSpPr>
+            <a:spLocks noGrp="1"/>
+          </p:cNvSpPr>
+          <p:nvPr>
+            <p:ph type="body" idx="1"/>
+          </p:nvPr>
+        </p:nvSpPr>
+        <p:spPr/>
+        <p:txBody>
+          <a:bodyPr/>
+          <a:lstStyle/>
+          <a:p>
+            <a:r>
+              <a:rPr lang="en-US" dirty="0"/>
+              <a:t>TaskManualCRS.png</a:t>
+            </a:r>
+            <a:endParaRPr lang="en-DK" dirty="0"/>
+          </a:p>
+        </p:txBody>
+      </p:sp>
+      <p:sp>
+        <p:nvSpPr>
+          <p:cNvPr id="4" name="Slide Number Placeholder 3"/>
+          <p:cNvSpPr>
+            <a:spLocks noGrp="1"/>
+          </p:cNvSpPr>
+          <p:nvPr>
+            <p:ph type="sldNum" sz="quarter" idx="5"/>
+          </p:nvPr>
+        </p:nvSpPr>
+        <p:spPr/>
+        <p:txBody>
+          <a:bodyPr/>
+          <a:lstStyle/>
+          <a:p>
+            <a:fld id="{3673C79A-452F-414A-AC94-4E22DAD01198}" type="slidenum">
+              <a:rPr lang="en-DK" smtClean="0"/>
+              <a:t>8</a:t>
+            </a:fld>
+            <a:endParaRPr lang="en-DK"/>
+          </a:p>
+        </p:txBody>
+      </p:sp>
+    </p:spTree>
+    <p:extLst>
+      <p:ext uri="{BB962C8B-B14F-4D97-AF65-F5344CB8AC3E}">
+        <p14:creationId xmlns:p14="http://schemas.microsoft.com/office/powerpoint/2010/main" val="3337874275"/>
+      </p:ext>
+    </p:extLst>
+  </p:cSld>
+  <p:clrMapOvr>
+    <a:masterClrMapping/>
+  </p:clrMapOvr>
+</p:notes>
+</file>
+
+<file path=ppt/notesSlides/notesSlide9.xml><?xml version="1.0" encoding="utf-8"?>
+<p:notes xmlns:a="http://schemas.openxmlformats.org/drawingml/2006/main" xmlns:r="http://schemas.openxmlformats.org/officeDocument/2006/relationships" xmlns:p="http://schemas.openxmlformats.org/presentationml/2006/main">
+  <p:cSld>
+    <p:spTree>
+      <p:nvGrpSpPr>
+        <p:cNvPr id="1" name=""/>
+        <p:cNvGrpSpPr/>
+        <p:nvPr/>
+      </p:nvGrpSpPr>
+      <p:grpSpPr>
+        <a:xfrm>
+          <a:off x="0" y="0"/>
+          <a:ext cx="0" cy="0"/>
+          <a:chOff x="0" y="0"/>
+          <a:chExt cx="0" cy="0"/>
+        </a:xfrm>
+      </p:grpSpPr>
+      <p:sp>
+        <p:nvSpPr>
+          <p:cNvPr id="2" name="Slide Image Placeholder 1"/>
+          <p:cNvSpPr>
+            <a:spLocks noGrp="1" noRot="1" noChangeAspect="1"/>
+          </p:cNvSpPr>
+          <p:nvPr>
+            <p:ph type="sldImg"/>
+          </p:nvPr>
+        </p:nvSpPr>
+        <p:spPr/>
+      </p:sp>
+      <p:sp>
+        <p:nvSpPr>
+          <p:cNvPr id="3" name="Notes Placeholder 2"/>
+          <p:cNvSpPr>
+            <a:spLocks noGrp="1"/>
+          </p:cNvSpPr>
+          <p:nvPr>
+            <p:ph type="body" idx="1"/>
+          </p:nvPr>
+        </p:nvSpPr>
+        <p:spPr/>
+        <p:txBody>
+          <a:bodyPr/>
+          <a:lstStyle/>
+          <a:p>
+            <a:r>
+              <a:rPr lang="en-US" dirty="0"/>
+              <a:t>TaskNRS.png</a:t>
+            </a:r>
+            <a:endParaRPr lang="en-DK" dirty="0"/>
+          </a:p>
+        </p:txBody>
+      </p:sp>
+      <p:sp>
+        <p:nvSpPr>
+          <p:cNvPr id="4" name="Slide Number Placeholder 3"/>
+          <p:cNvSpPr>
+            <a:spLocks noGrp="1"/>
+          </p:cNvSpPr>
+          <p:nvPr>
+            <p:ph type="sldNum" sz="quarter" idx="5"/>
+          </p:nvPr>
+        </p:nvSpPr>
+        <p:spPr/>
+        <p:txBody>
+          <a:bodyPr/>
+          <a:lstStyle/>
+          <a:p>
+            <a:fld id="{3673C79A-452F-414A-AC94-4E22DAD01198}" type="slidenum">
+              <a:rPr lang="en-DK" smtClean="0"/>
+              <a:t>9</a:t>
+            </a:fld>
+            <a:endParaRPr lang="en-DK"/>
+          </a:p>
+        </p:txBody>
+      </p:sp>
+    </p:spTree>
+    <p:extLst>
+      <p:ext uri="{BB962C8B-B14F-4D97-AF65-F5344CB8AC3E}">
+        <p14:creationId xmlns:p14="http://schemas.microsoft.com/office/powerpoint/2010/main" val="554539611"/>
       </p:ext>
     </p:extLst>
   </p:cSld>
@@ -1257,6 +2285,200 @@
     <p:extLst>
       <p:ext uri="{BB962C8B-B14F-4D97-AF65-F5344CB8AC3E}">
         <p14:creationId xmlns:p14="http://schemas.microsoft.com/office/powerpoint/2010/main" val="407173749"/>
+      </p:ext>
+    </p:extLst>
+  </p:cSld>
+  <p:clrMapOvr>
+    <a:masterClrMapping/>
+  </p:clrMapOvr>
+</p:sldLayout>
+</file>
+
+<file path=ppt/slideLayouts/slideLayout12.xml><?xml version="1.0" encoding="utf-8"?>
+<p:sldLayout xmlns:a="http://schemas.openxmlformats.org/drawingml/2006/main" xmlns:r="http://schemas.openxmlformats.org/officeDocument/2006/relationships" xmlns:p="http://schemas.openxmlformats.org/presentationml/2006/main" preserve="1" userDrawn="1">
+  <p:cSld name="Blank">
+    <p:spTree>
+      <p:nvGrpSpPr>
+        <p:cNvPr id="1" name=""/>
+        <p:cNvGrpSpPr/>
+        <p:nvPr/>
+      </p:nvGrpSpPr>
+      <p:grpSpPr>
+        <a:xfrm>
+          <a:off x="0" y="0"/>
+          <a:ext cx="0" cy="0"/>
+          <a:chOff x="0" y="0"/>
+          <a:chExt cx="0" cy="0"/>
+        </a:xfrm>
+      </p:grpSpPr>
+    </p:spTree>
+    <p:extLst>
+      <p:ext uri="{BB962C8B-B14F-4D97-AF65-F5344CB8AC3E}">
+        <p14:creationId xmlns:p14="http://schemas.microsoft.com/office/powerpoint/2010/main" val="2415096842"/>
+      </p:ext>
+    </p:extLst>
+  </p:cSld>
+  <p:clrMapOvr>
+    <a:masterClrMapping/>
+  </p:clrMapOvr>
+</p:sldLayout>
+</file>
+
+<file path=ppt/slideLayouts/slideLayout13.xml><?xml version="1.0" encoding="utf-8"?>
+<p:sldLayout xmlns:a="http://schemas.openxmlformats.org/drawingml/2006/main" xmlns:r="http://schemas.openxmlformats.org/officeDocument/2006/relationships" xmlns:p="http://schemas.openxmlformats.org/presentationml/2006/main" preserve="1" userDrawn="1">
+  <p:cSld name="Fiducial (27&quot;)">
+    <p:spTree>
+      <p:nvGrpSpPr>
+        <p:cNvPr id="1" name=""/>
+        <p:cNvGrpSpPr/>
+        <p:nvPr/>
+      </p:nvGrpSpPr>
+      <p:grpSpPr>
+        <a:xfrm>
+          <a:off x="0" y="0"/>
+          <a:ext cx="0" cy="0"/>
+          <a:chOff x="0" y="0"/>
+          <a:chExt cx="0" cy="0"/>
+        </a:xfrm>
+      </p:grpSpPr>
+      <p:sp>
+        <p:nvSpPr>
+          <p:cNvPr id="2" name="Oval 1">
+            <a:extLst>
+              <a:ext uri="{FF2B5EF4-FFF2-40B4-BE49-F238E27FC236}">
+                <a16:creationId xmlns:a16="http://schemas.microsoft.com/office/drawing/2014/main" id="{D70C5DF6-CD1F-55C9-DC77-11582FC30E39}"/>
+              </a:ext>
+            </a:extLst>
+          </p:cNvPr>
+          <p:cNvSpPr/>
+          <p:nvPr userDrawn="1"/>
+        </p:nvSpPr>
+        <p:spPr>
+          <a:xfrm>
+            <a:off x="11529753" y="167730"/>
+            <a:ext cx="472423" cy="447411"/>
+          </a:xfrm>
+          <a:prstGeom prst="ellipse">
+            <a:avLst/>
+          </a:prstGeom>
+          <a:solidFill>
+            <a:srgbClr val="FFFFFF"/>
+          </a:solidFill>
+          <a:ln>
+            <a:noFill/>
+          </a:ln>
+        </p:spPr>
+        <p:style>
+          <a:lnRef idx="2">
+            <a:schemeClr val="accent1">
+              <a:shade val="15000"/>
+            </a:schemeClr>
+          </a:lnRef>
+          <a:fillRef idx="1">
+            <a:schemeClr val="accent1"/>
+          </a:fillRef>
+          <a:effectRef idx="0">
+            <a:schemeClr val="accent1"/>
+          </a:effectRef>
+          <a:fontRef idx="minor">
+            <a:schemeClr val="lt1"/>
+          </a:fontRef>
+        </p:style>
+        <p:txBody>
+          <a:bodyPr rtlCol="0" anchor="ctr"/>
+          <a:lstStyle/>
+          <a:p>
+            <a:pPr algn="ctr"/>
+            <a:endParaRPr lang="en-DK"/>
+          </a:p>
+        </p:txBody>
+      </p:sp>
+    </p:spTree>
+    <p:extLst>
+      <p:ext uri="{BB962C8B-B14F-4D97-AF65-F5344CB8AC3E}">
+        <p14:creationId xmlns:p14="http://schemas.microsoft.com/office/powerpoint/2010/main" val="1704253585"/>
+      </p:ext>
+    </p:extLst>
+  </p:cSld>
+  <p:clrMapOvr>
+    <a:masterClrMapping/>
+  </p:clrMapOvr>
+</p:sldLayout>
+</file>
+
+<file path=ppt/slideLayouts/slideLayout14.xml><?xml version="1.0" encoding="utf-8"?>
+<p:sldLayout xmlns:a="http://schemas.openxmlformats.org/drawingml/2006/main" xmlns:r="http://schemas.openxmlformats.org/officeDocument/2006/relationships" xmlns:p="http://schemas.openxmlformats.org/presentationml/2006/main" preserve="1" userDrawn="1">
+  <p:cSld name="1_Fiducial (24&quot;)">
+    <p:spTree>
+      <p:nvGrpSpPr>
+        <p:cNvPr id="1" name=""/>
+        <p:cNvGrpSpPr/>
+        <p:nvPr/>
+      </p:nvGrpSpPr>
+      <p:grpSpPr>
+        <a:xfrm>
+          <a:off x="0" y="0"/>
+          <a:ext cx="0" cy="0"/>
+          <a:chOff x="0" y="0"/>
+          <a:chExt cx="0" cy="0"/>
+        </a:xfrm>
+      </p:grpSpPr>
+      <p:sp>
+        <p:nvSpPr>
+          <p:cNvPr id="2" name="Oval 1">
+            <a:extLst>
+              <a:ext uri="{FF2B5EF4-FFF2-40B4-BE49-F238E27FC236}">
+                <a16:creationId xmlns:a16="http://schemas.microsoft.com/office/drawing/2014/main" id="{30EC4258-E658-AA42-C0FE-69BD278F5F67}"/>
+              </a:ext>
+            </a:extLst>
+          </p:cNvPr>
+          <p:cNvSpPr/>
+          <p:nvPr userDrawn="1"/>
+        </p:nvSpPr>
+        <p:spPr>
+          <a:xfrm>
+            <a:off x="11529753" y="167730"/>
+            <a:ext cx="472423" cy="447411"/>
+          </a:xfrm>
+          <a:prstGeom prst="ellipse">
+            <a:avLst/>
+          </a:prstGeom>
+          <a:solidFill>
+            <a:srgbClr val="FFFFFF"/>
+          </a:solidFill>
+          <a:ln>
+            <a:noFill/>
+          </a:ln>
+        </p:spPr>
+        <p:style>
+          <a:lnRef idx="2">
+            <a:schemeClr val="accent1">
+              <a:shade val="15000"/>
+            </a:schemeClr>
+          </a:lnRef>
+          <a:fillRef idx="1">
+            <a:schemeClr val="accent1"/>
+          </a:fillRef>
+          <a:effectRef idx="0">
+            <a:schemeClr val="accent1"/>
+          </a:effectRef>
+          <a:fontRef idx="minor">
+            <a:schemeClr val="lt1"/>
+          </a:fontRef>
+        </p:style>
+        <p:txBody>
+          <a:bodyPr rtlCol="0" anchor="ctr"/>
+          <a:lstStyle/>
+          <a:p>
+            <a:pPr algn="ctr"/>
+            <a:endParaRPr lang="en-DK"/>
+          </a:p>
+        </p:txBody>
+      </p:sp>
+    </p:spTree>
+    <p:extLst>
+      <p:ext uri="{BB962C8B-B14F-4D97-AF65-F5344CB8AC3E}">
+        <p14:creationId xmlns:p14="http://schemas.microsoft.com/office/powerpoint/2010/main" val="1250855399"/>
       </p:ext>
     </p:extLst>
   </p:cSld>
@@ -3852,6 +5074,324 @@
 </p:sldMaster>
 </file>
 
+<file path=ppt/slideMasters/slideMaster2.xml><?xml version="1.0" encoding="utf-8"?>
+<p:sldMaster xmlns:a="http://schemas.openxmlformats.org/drawingml/2006/main" xmlns:r="http://schemas.openxmlformats.org/officeDocument/2006/relationships" xmlns:p="http://schemas.openxmlformats.org/presentationml/2006/main">
+  <p:cSld>
+    <p:bg>
+      <p:bgRef idx="1001">
+        <a:schemeClr val="bg1"/>
+      </p:bgRef>
+    </p:bg>
+    <p:spTree>
+      <p:nvGrpSpPr>
+        <p:cNvPr id="1" name=""/>
+        <p:cNvGrpSpPr/>
+        <p:nvPr/>
+      </p:nvGrpSpPr>
+      <p:grpSpPr>
+        <a:xfrm>
+          <a:off x="0" y="0"/>
+          <a:ext cx="0" cy="0"/>
+          <a:chOff x="0" y="0"/>
+          <a:chExt cx="0" cy="0"/>
+        </a:xfrm>
+      </p:grpSpPr>
+    </p:spTree>
+    <p:extLst>
+      <p:ext uri="{BB962C8B-B14F-4D97-AF65-F5344CB8AC3E}">
+        <p14:creationId xmlns:p14="http://schemas.microsoft.com/office/powerpoint/2010/main" val="2631421774"/>
+      </p:ext>
+    </p:extLst>
+  </p:cSld>
+  <p:clrMap bg1="dk1" tx1="lt1" bg2="dk2" tx2="lt2" accent1="accent1" accent2="accent2" accent3="accent3" accent4="accent4" accent5="accent5" accent6="accent6" hlink="hlink" folHlink="folHlink"/>
+  <p:sldLayoutIdLst>
+    <p:sldLayoutId id="2147483661" r:id="rId1"/>
+    <p:sldLayoutId id="2147483662" r:id="rId2"/>
+    <p:sldLayoutId id="2147483663" r:id="rId3"/>
+  </p:sldLayoutIdLst>
+  <p:txStyles>
+    <p:titleStyle>
+      <a:lvl1pPr algn="l" defTabSz="914400" rtl="0" eaLnBrk="1" latinLnBrk="0" hangingPunct="1">
+        <a:lnSpc>
+          <a:spcPct val="90000"/>
+        </a:lnSpc>
+        <a:spcBef>
+          <a:spcPct val="0"/>
+        </a:spcBef>
+        <a:buNone/>
+        <a:defRPr sz="4400" kern="1200">
+          <a:solidFill>
+            <a:schemeClr val="tx1"/>
+          </a:solidFill>
+          <a:latin typeface="+mj-lt"/>
+          <a:ea typeface="+mj-ea"/>
+          <a:cs typeface="+mj-cs"/>
+        </a:defRPr>
+      </a:lvl1pPr>
+    </p:titleStyle>
+    <p:bodyStyle>
+      <a:lvl1pPr marL="228600" indent="-228600" algn="l" defTabSz="914400" rtl="0" eaLnBrk="1" latinLnBrk="0" hangingPunct="1">
+        <a:lnSpc>
+          <a:spcPct val="90000"/>
+        </a:lnSpc>
+        <a:spcBef>
+          <a:spcPts val="1000"/>
+        </a:spcBef>
+        <a:buFont typeface="Arial" panose="020B0604020202020204" pitchFamily="34" charset="0"/>
+        <a:buChar char="•"/>
+        <a:defRPr sz="2800" kern="1200">
+          <a:solidFill>
+            <a:schemeClr val="tx1"/>
+          </a:solidFill>
+          <a:latin typeface="+mn-lt"/>
+          <a:ea typeface="+mn-ea"/>
+          <a:cs typeface="+mn-cs"/>
+        </a:defRPr>
+      </a:lvl1pPr>
+      <a:lvl2pPr marL="685800" indent="-228600" algn="l" defTabSz="914400" rtl="0" eaLnBrk="1" latinLnBrk="0" hangingPunct="1">
+        <a:lnSpc>
+          <a:spcPct val="90000"/>
+        </a:lnSpc>
+        <a:spcBef>
+          <a:spcPts val="500"/>
+        </a:spcBef>
+        <a:buFont typeface="Arial" panose="020B0604020202020204" pitchFamily="34" charset="0"/>
+        <a:buChar char="•"/>
+        <a:defRPr sz="2400" kern="1200">
+          <a:solidFill>
+            <a:schemeClr val="tx1"/>
+          </a:solidFill>
+          <a:latin typeface="+mn-lt"/>
+          <a:ea typeface="+mn-ea"/>
+          <a:cs typeface="+mn-cs"/>
+        </a:defRPr>
+      </a:lvl2pPr>
+      <a:lvl3pPr marL="1143000" indent="-228600" algn="l" defTabSz="914400" rtl="0" eaLnBrk="1" latinLnBrk="0" hangingPunct="1">
+        <a:lnSpc>
+          <a:spcPct val="90000"/>
+        </a:lnSpc>
+        <a:spcBef>
+          <a:spcPts val="500"/>
+        </a:spcBef>
+        <a:buFont typeface="Arial" panose="020B0604020202020204" pitchFamily="34" charset="0"/>
+        <a:buChar char="•"/>
+        <a:defRPr sz="2000" kern="1200">
+          <a:solidFill>
+            <a:schemeClr val="tx1"/>
+          </a:solidFill>
+          <a:latin typeface="+mn-lt"/>
+          <a:ea typeface="+mn-ea"/>
+          <a:cs typeface="+mn-cs"/>
+        </a:defRPr>
+      </a:lvl3pPr>
+      <a:lvl4pPr marL="1600200" indent="-228600" algn="l" defTabSz="914400" rtl="0" eaLnBrk="1" latinLnBrk="0" hangingPunct="1">
+        <a:lnSpc>
+          <a:spcPct val="90000"/>
+        </a:lnSpc>
+        <a:spcBef>
+          <a:spcPts val="500"/>
+        </a:spcBef>
+        <a:buFont typeface="Arial" panose="020B0604020202020204" pitchFamily="34" charset="0"/>
+        <a:buChar char="•"/>
+        <a:defRPr sz="1800" kern="1200">
+          <a:solidFill>
+            <a:schemeClr val="tx1"/>
+          </a:solidFill>
+          <a:latin typeface="+mn-lt"/>
+          <a:ea typeface="+mn-ea"/>
+          <a:cs typeface="+mn-cs"/>
+        </a:defRPr>
+      </a:lvl4pPr>
+      <a:lvl5pPr marL="2057400" indent="-228600" algn="l" defTabSz="914400" rtl="0" eaLnBrk="1" latinLnBrk="0" hangingPunct="1">
+        <a:lnSpc>
+          <a:spcPct val="90000"/>
+        </a:lnSpc>
+        <a:spcBef>
+          <a:spcPts val="500"/>
+        </a:spcBef>
+        <a:buFont typeface="Arial" panose="020B0604020202020204" pitchFamily="34" charset="0"/>
+        <a:buChar char="•"/>
+        <a:defRPr sz="1800" kern="1200">
+          <a:solidFill>
+            <a:schemeClr val="tx1"/>
+          </a:solidFill>
+          <a:latin typeface="+mn-lt"/>
+          <a:ea typeface="+mn-ea"/>
+          <a:cs typeface="+mn-cs"/>
+        </a:defRPr>
+      </a:lvl5pPr>
+      <a:lvl6pPr marL="2514600" indent="-228600" algn="l" defTabSz="914400" rtl="0" eaLnBrk="1" latinLnBrk="0" hangingPunct="1">
+        <a:lnSpc>
+          <a:spcPct val="90000"/>
+        </a:lnSpc>
+        <a:spcBef>
+          <a:spcPts val="500"/>
+        </a:spcBef>
+        <a:buFont typeface="Arial" panose="020B0604020202020204" pitchFamily="34" charset="0"/>
+        <a:buChar char="•"/>
+        <a:defRPr sz="1800" kern="1200">
+          <a:solidFill>
+            <a:schemeClr val="tx1"/>
+          </a:solidFill>
+          <a:latin typeface="+mn-lt"/>
+          <a:ea typeface="+mn-ea"/>
+          <a:cs typeface="+mn-cs"/>
+        </a:defRPr>
+      </a:lvl6pPr>
+      <a:lvl7pPr marL="2971800" indent="-228600" algn="l" defTabSz="914400" rtl="0" eaLnBrk="1" latinLnBrk="0" hangingPunct="1">
+        <a:lnSpc>
+          <a:spcPct val="90000"/>
+        </a:lnSpc>
+        <a:spcBef>
+          <a:spcPts val="500"/>
+        </a:spcBef>
+        <a:buFont typeface="Arial" panose="020B0604020202020204" pitchFamily="34" charset="0"/>
+        <a:buChar char="•"/>
+        <a:defRPr sz="1800" kern="1200">
+          <a:solidFill>
+            <a:schemeClr val="tx1"/>
+          </a:solidFill>
+          <a:latin typeface="+mn-lt"/>
+          <a:ea typeface="+mn-ea"/>
+          <a:cs typeface="+mn-cs"/>
+        </a:defRPr>
+      </a:lvl7pPr>
+      <a:lvl8pPr marL="3429000" indent="-228600" algn="l" defTabSz="914400" rtl="0" eaLnBrk="1" latinLnBrk="0" hangingPunct="1">
+        <a:lnSpc>
+          <a:spcPct val="90000"/>
+        </a:lnSpc>
+        <a:spcBef>
+          <a:spcPts val="500"/>
+        </a:spcBef>
+        <a:buFont typeface="Arial" panose="020B0604020202020204" pitchFamily="34" charset="0"/>
+        <a:buChar char="•"/>
+        <a:defRPr sz="1800" kern="1200">
+          <a:solidFill>
+            <a:schemeClr val="tx1"/>
+          </a:solidFill>
+          <a:latin typeface="+mn-lt"/>
+          <a:ea typeface="+mn-ea"/>
+          <a:cs typeface="+mn-cs"/>
+        </a:defRPr>
+      </a:lvl8pPr>
+      <a:lvl9pPr marL="3886200" indent="-228600" algn="l" defTabSz="914400" rtl="0" eaLnBrk="1" latinLnBrk="0" hangingPunct="1">
+        <a:lnSpc>
+          <a:spcPct val="90000"/>
+        </a:lnSpc>
+        <a:spcBef>
+          <a:spcPts val="500"/>
+        </a:spcBef>
+        <a:buFont typeface="Arial" panose="020B0604020202020204" pitchFamily="34" charset="0"/>
+        <a:buChar char="•"/>
+        <a:defRPr sz="1800" kern="1200">
+          <a:solidFill>
+            <a:schemeClr val="tx1"/>
+          </a:solidFill>
+          <a:latin typeface="+mn-lt"/>
+          <a:ea typeface="+mn-ea"/>
+          <a:cs typeface="+mn-cs"/>
+        </a:defRPr>
+      </a:lvl9pPr>
+    </p:bodyStyle>
+    <p:otherStyle>
+      <a:defPPr>
+        <a:defRPr lang="en-DK"/>
+      </a:defPPr>
+      <a:lvl1pPr marL="0" algn="l" defTabSz="914400" rtl="0" eaLnBrk="1" latinLnBrk="0" hangingPunct="1">
+        <a:defRPr sz="1800" kern="1200">
+          <a:solidFill>
+            <a:schemeClr val="tx1"/>
+          </a:solidFill>
+          <a:latin typeface="+mn-lt"/>
+          <a:ea typeface="+mn-ea"/>
+          <a:cs typeface="+mn-cs"/>
+        </a:defRPr>
+      </a:lvl1pPr>
+      <a:lvl2pPr marL="457200" algn="l" defTabSz="914400" rtl="0" eaLnBrk="1" latinLnBrk="0" hangingPunct="1">
+        <a:defRPr sz="1800" kern="1200">
+          <a:solidFill>
+            <a:schemeClr val="tx1"/>
+          </a:solidFill>
+          <a:latin typeface="+mn-lt"/>
+          <a:ea typeface="+mn-ea"/>
+          <a:cs typeface="+mn-cs"/>
+        </a:defRPr>
+      </a:lvl2pPr>
+      <a:lvl3pPr marL="914400" algn="l" defTabSz="914400" rtl="0" eaLnBrk="1" latinLnBrk="0" hangingPunct="1">
+        <a:defRPr sz="1800" kern="1200">
+          <a:solidFill>
+            <a:schemeClr val="tx1"/>
+          </a:solidFill>
+          <a:latin typeface="+mn-lt"/>
+          <a:ea typeface="+mn-ea"/>
+          <a:cs typeface="+mn-cs"/>
+        </a:defRPr>
+      </a:lvl3pPr>
+      <a:lvl4pPr marL="1371600" algn="l" defTabSz="914400" rtl="0" eaLnBrk="1" latinLnBrk="0" hangingPunct="1">
+        <a:defRPr sz="1800" kern="1200">
+          <a:solidFill>
+            <a:schemeClr val="tx1"/>
+          </a:solidFill>
+          <a:latin typeface="+mn-lt"/>
+          <a:ea typeface="+mn-ea"/>
+          <a:cs typeface="+mn-cs"/>
+        </a:defRPr>
+      </a:lvl4pPr>
+      <a:lvl5pPr marL="1828800" algn="l" defTabSz="914400" rtl="0" eaLnBrk="1" latinLnBrk="0" hangingPunct="1">
+        <a:defRPr sz="1800" kern="1200">
+          <a:solidFill>
+            <a:schemeClr val="tx1"/>
+          </a:solidFill>
+          <a:latin typeface="+mn-lt"/>
+          <a:ea typeface="+mn-ea"/>
+          <a:cs typeface="+mn-cs"/>
+        </a:defRPr>
+      </a:lvl5pPr>
+      <a:lvl6pPr marL="2286000" algn="l" defTabSz="914400" rtl="0" eaLnBrk="1" latinLnBrk="0" hangingPunct="1">
+        <a:defRPr sz="1800" kern="1200">
+          <a:solidFill>
+            <a:schemeClr val="tx1"/>
+          </a:solidFill>
+          <a:latin typeface="+mn-lt"/>
+          <a:ea typeface="+mn-ea"/>
+          <a:cs typeface="+mn-cs"/>
+        </a:defRPr>
+      </a:lvl6pPr>
+      <a:lvl7pPr marL="2743200" algn="l" defTabSz="914400" rtl="0" eaLnBrk="1" latinLnBrk="0" hangingPunct="1">
+        <a:defRPr sz="1800" kern="1200">
+          <a:solidFill>
+            <a:schemeClr val="tx1"/>
+          </a:solidFill>
+          <a:latin typeface="+mn-lt"/>
+          <a:ea typeface="+mn-ea"/>
+          <a:cs typeface="+mn-cs"/>
+        </a:defRPr>
+      </a:lvl7pPr>
+      <a:lvl8pPr marL="3200400" algn="l" defTabSz="914400" rtl="0" eaLnBrk="1" latinLnBrk="0" hangingPunct="1">
+        <a:defRPr sz="1800" kern="1200">
+          <a:solidFill>
+            <a:schemeClr val="tx1"/>
+          </a:solidFill>
+          <a:latin typeface="+mn-lt"/>
+          <a:ea typeface="+mn-ea"/>
+          <a:cs typeface="+mn-cs"/>
+        </a:defRPr>
+      </a:lvl8pPr>
+      <a:lvl9pPr marL="3657600" algn="l" defTabSz="914400" rtl="0" eaLnBrk="1" latinLnBrk="0" hangingPunct="1">
+        <a:defRPr sz="1800" kern="1200">
+          <a:solidFill>
+            <a:schemeClr val="tx1"/>
+          </a:solidFill>
+          <a:latin typeface="+mn-lt"/>
+          <a:ea typeface="+mn-ea"/>
+          <a:cs typeface="+mn-cs"/>
+        </a:defRPr>
+      </a:lvl9pPr>
+    </p:otherStyle>
+  </p:txStyles>
+</p:sldMaster>
+</file>
+
 <file path=ppt/slides/slide1.xml><?xml version="1.0" encoding="utf-8"?>
 <p:sld xmlns:a="http://schemas.openxmlformats.org/drawingml/2006/main" xmlns:r="http://schemas.openxmlformats.org/officeDocument/2006/relationships" xmlns:p="http://schemas.openxmlformats.org/presentationml/2006/main">
   <p:cSld>
@@ -4314,6 +5854,1677 @@
 </p:sld>
 </file>
 
+<file path=ppt/slides/slide10.xml><?xml version="1.0" encoding="utf-8"?>
+<p:sld xmlns:a="http://schemas.openxmlformats.org/drawingml/2006/main" xmlns:r="http://schemas.openxmlformats.org/officeDocument/2006/relationships" xmlns:p="http://schemas.openxmlformats.org/presentationml/2006/main">
+  <p:cSld>
+    <p:spTree>
+      <p:nvGrpSpPr>
+        <p:cNvPr id="1" name=""/>
+        <p:cNvGrpSpPr/>
+        <p:nvPr/>
+      </p:nvGrpSpPr>
+      <p:grpSpPr>
+        <a:xfrm>
+          <a:off x="0" y="0"/>
+          <a:ext cx="0" cy="0"/>
+          <a:chOff x="0" y="0"/>
+          <a:chExt cx="0" cy="0"/>
+        </a:xfrm>
+      </p:grpSpPr>
+      <p:pic>
+        <p:nvPicPr>
+          <p:cNvPr id="3" name="Picture 2">
+            <a:extLst>
+              <a:ext uri="{FF2B5EF4-FFF2-40B4-BE49-F238E27FC236}">
+                <a16:creationId xmlns:a16="http://schemas.microsoft.com/office/drawing/2014/main" id="{D0C91730-0CC0-C546-51DC-03920F12B645}"/>
+              </a:ext>
+            </a:extLst>
+          </p:cNvPr>
+          <p:cNvPicPr>
+            <a:picLocks noChangeAspect="1"/>
+          </p:cNvPicPr>
+          <p:nvPr/>
+        </p:nvPicPr>
+        <p:blipFill>
+          <a:blip r:embed="rId3"/>
+          <a:stretch>
+            <a:fillRect/>
+          </a:stretch>
+        </p:blipFill>
+        <p:spPr>
+          <a:xfrm>
+            <a:off x="3278609" y="1989000"/>
+            <a:ext cx="5634782" cy="2880000"/>
+          </a:xfrm>
+          <a:prstGeom prst="rect">
+            <a:avLst/>
+          </a:prstGeom>
+        </p:spPr>
+      </p:pic>
+    </p:spTree>
+    <p:extLst>
+      <p:ext uri="{BB962C8B-B14F-4D97-AF65-F5344CB8AC3E}">
+        <p14:creationId xmlns:p14="http://schemas.microsoft.com/office/powerpoint/2010/main" val="498466484"/>
+      </p:ext>
+    </p:extLst>
+  </p:cSld>
+  <p:clrMapOvr>
+    <a:masterClrMapping/>
+  </p:clrMapOvr>
+</p:sld>
+</file>
+
+<file path=ppt/slides/slide11.xml><?xml version="1.0" encoding="utf-8"?>
+<p:sld xmlns:a="http://schemas.openxmlformats.org/drawingml/2006/main" xmlns:r="http://schemas.openxmlformats.org/officeDocument/2006/relationships" xmlns:p="http://schemas.openxmlformats.org/presentationml/2006/main">
+  <p:cSld>
+    <p:spTree>
+      <p:nvGrpSpPr>
+        <p:cNvPr id="1" name=""/>
+        <p:cNvGrpSpPr/>
+        <p:nvPr/>
+      </p:nvGrpSpPr>
+      <p:grpSpPr>
+        <a:xfrm>
+          <a:off x="0" y="0"/>
+          <a:ext cx="0" cy="0"/>
+          <a:chOff x="0" y="0"/>
+          <a:chExt cx="0" cy="0"/>
+        </a:xfrm>
+      </p:grpSpPr>
+      <p:pic>
+        <p:nvPicPr>
+          <p:cNvPr id="3" name="Picture 2">
+            <a:extLst>
+              <a:ext uri="{FF2B5EF4-FFF2-40B4-BE49-F238E27FC236}">
+                <a16:creationId xmlns:a16="http://schemas.microsoft.com/office/drawing/2014/main" id="{601590FE-24CB-109C-812D-71ACDD2380A1}"/>
+              </a:ext>
+            </a:extLst>
+          </p:cNvPr>
+          <p:cNvPicPr>
+            <a:picLocks noChangeAspect="1"/>
+          </p:cNvPicPr>
+          <p:nvPr/>
+        </p:nvPicPr>
+        <p:blipFill>
+          <a:blip r:embed="rId3"/>
+          <a:stretch>
+            <a:fillRect/>
+          </a:stretch>
+        </p:blipFill>
+        <p:spPr>
+          <a:xfrm>
+            <a:off x="2173679" y="1989000"/>
+            <a:ext cx="3924528" cy="2880000"/>
+          </a:xfrm>
+          <a:prstGeom prst="rect">
+            <a:avLst/>
+          </a:prstGeom>
+        </p:spPr>
+      </p:pic>
+      <p:pic>
+        <p:nvPicPr>
+          <p:cNvPr id="5" name="Picture 4">
+            <a:extLst>
+              <a:ext uri="{FF2B5EF4-FFF2-40B4-BE49-F238E27FC236}">
+                <a16:creationId xmlns:a16="http://schemas.microsoft.com/office/drawing/2014/main" id="{6211F9BC-C9D3-6B2C-11D1-0E107B2DBECD}"/>
+              </a:ext>
+            </a:extLst>
+          </p:cNvPr>
+          <p:cNvPicPr>
+            <a:picLocks noChangeAspect="1"/>
+          </p:cNvPicPr>
+          <p:nvPr/>
+        </p:nvPicPr>
+        <p:blipFill>
+          <a:blip r:embed="rId4"/>
+          <a:stretch>
+            <a:fillRect/>
+          </a:stretch>
+        </p:blipFill>
+        <p:spPr>
+          <a:xfrm>
+            <a:off x="6162101" y="1989000"/>
+            <a:ext cx="5358140" cy="2880000"/>
+          </a:xfrm>
+          <a:prstGeom prst="rect">
+            <a:avLst/>
+          </a:prstGeom>
+        </p:spPr>
+      </p:pic>
+      <p:sp>
+        <p:nvSpPr>
+          <p:cNvPr id="6" name="TextBox 5">
+            <a:extLst>
+              <a:ext uri="{FF2B5EF4-FFF2-40B4-BE49-F238E27FC236}">
+                <a16:creationId xmlns:a16="http://schemas.microsoft.com/office/drawing/2014/main" id="{F94725B1-A43F-BA5E-E270-1646DEEEA183}"/>
+              </a:ext>
+            </a:extLst>
+          </p:cNvPr>
+          <p:cNvSpPr txBox="1"/>
+          <p:nvPr/>
+        </p:nvSpPr>
+        <p:spPr>
+          <a:xfrm>
+            <a:off x="2173679" y="1527335"/>
+            <a:ext cx="455574" cy="461665"/>
+          </a:xfrm>
+          <a:prstGeom prst="rect">
+            <a:avLst/>
+          </a:prstGeom>
+          <a:noFill/>
+        </p:spPr>
+        <p:txBody>
+          <a:bodyPr wrap="none" rtlCol="0">
+            <a:spAutoFit/>
+          </a:bodyPr>
+          <a:lstStyle/>
+          <a:p>
+            <a:r>
+              <a:rPr lang="en-US" sz="2400" dirty="0"/>
+              <a:t>A)</a:t>
+            </a:r>
+            <a:endParaRPr lang="en-DK" sz="2400" dirty="0"/>
+          </a:p>
+        </p:txBody>
+      </p:sp>
+      <p:sp>
+        <p:nvSpPr>
+          <p:cNvPr id="7" name="TextBox 6">
+            <a:extLst>
+              <a:ext uri="{FF2B5EF4-FFF2-40B4-BE49-F238E27FC236}">
+                <a16:creationId xmlns:a16="http://schemas.microsoft.com/office/drawing/2014/main" id="{BEAECE98-2177-4C88-3EA8-0D9F3BD02B03}"/>
+              </a:ext>
+            </a:extLst>
+          </p:cNvPr>
+          <p:cNvSpPr txBox="1"/>
+          <p:nvPr/>
+        </p:nvSpPr>
+        <p:spPr>
+          <a:xfrm>
+            <a:off x="6096000" y="1527334"/>
+            <a:ext cx="460382" cy="461665"/>
+          </a:xfrm>
+          <a:prstGeom prst="rect">
+            <a:avLst/>
+          </a:prstGeom>
+          <a:noFill/>
+        </p:spPr>
+        <p:txBody>
+          <a:bodyPr wrap="none" rtlCol="0">
+            <a:spAutoFit/>
+          </a:bodyPr>
+          <a:lstStyle/>
+          <a:p>
+            <a:r>
+              <a:rPr lang="en-US" sz="2400" dirty="0"/>
+              <a:t>B)</a:t>
+            </a:r>
+            <a:endParaRPr lang="en-DK" sz="2400" dirty="0"/>
+          </a:p>
+        </p:txBody>
+      </p:sp>
+    </p:spTree>
+    <p:extLst>
+      <p:ext uri="{BB962C8B-B14F-4D97-AF65-F5344CB8AC3E}">
+        <p14:creationId xmlns:p14="http://schemas.microsoft.com/office/powerpoint/2010/main" val="1524655595"/>
+      </p:ext>
+    </p:extLst>
+  </p:cSld>
+  <p:clrMapOvr>
+    <a:masterClrMapping/>
+  </p:clrMapOvr>
+</p:sld>
+</file>
+
+<file path=ppt/slides/slide12.xml><?xml version="1.0" encoding="utf-8"?>
+<p:sld xmlns:a="http://schemas.openxmlformats.org/drawingml/2006/main" xmlns:r="http://schemas.openxmlformats.org/officeDocument/2006/relationships" xmlns:p="http://schemas.openxmlformats.org/presentationml/2006/main">
+  <p:cSld>
+    <p:spTree>
+      <p:nvGrpSpPr>
+        <p:cNvPr id="1" name=""/>
+        <p:cNvGrpSpPr/>
+        <p:nvPr/>
+      </p:nvGrpSpPr>
+      <p:grpSpPr>
+        <a:xfrm>
+          <a:off x="0" y="0"/>
+          <a:ext cx="0" cy="0"/>
+          <a:chOff x="0" y="0"/>
+          <a:chExt cx="0" cy="0"/>
+        </a:xfrm>
+      </p:grpSpPr>
+      <p:sp>
+        <p:nvSpPr>
+          <p:cNvPr id="2" name="TextBox 1">
+            <a:extLst>
+              <a:ext uri="{FF2B5EF4-FFF2-40B4-BE49-F238E27FC236}">
+                <a16:creationId xmlns:a16="http://schemas.microsoft.com/office/drawing/2014/main" id="{1F3C6ED9-8C77-902E-9732-D1747B79D9BF}"/>
+              </a:ext>
+            </a:extLst>
+          </p:cNvPr>
+          <p:cNvSpPr txBox="1"/>
+          <p:nvPr/>
+        </p:nvSpPr>
+        <p:spPr>
+          <a:xfrm>
+            <a:off x="669074" y="446048"/>
+            <a:ext cx="10370633" cy="1569660"/>
+          </a:xfrm>
+          <a:prstGeom prst="rect">
+            <a:avLst/>
+          </a:prstGeom>
+          <a:noFill/>
+        </p:spPr>
+        <p:txBody>
+          <a:bodyPr wrap="square" rtlCol="0">
+            <a:spAutoFit/>
+          </a:bodyPr>
+          <a:lstStyle/>
+          <a:p>
+            <a:pPr marL="0" marR="0" lvl="0" indent="0" algn="just" defTabSz="914400" rtl="0" eaLnBrk="1" fontAlgn="auto" latinLnBrk="0" hangingPunct="1">
+              <a:lnSpc>
+                <a:spcPct val="100000"/>
+              </a:lnSpc>
+              <a:spcBef>
+                <a:spcPts val="0"/>
+              </a:spcBef>
+              <a:spcAft>
+                <a:spcPts val="0"/>
+              </a:spcAft>
+              <a:buClrTx/>
+              <a:buSzTx/>
+              <a:buFontTx/>
+              <a:buNone/>
+              <a:tabLst/>
+              <a:defRPr/>
+            </a:pPr>
+            <a:r>
+              <a:rPr kumimoji="0" lang="en-GB" sz="3200" b="0" i="0" u="none" strike="noStrike" kern="1200" cap="none" spc="0" normalizeH="0" baseline="0" noProof="0" dirty="0">
+                <a:ln>
+                  <a:noFill/>
+                </a:ln>
+                <a:solidFill>
+                  <a:prstClr val="white"/>
+                </a:solidFill>
+                <a:effectLst/>
+                <a:uLnTx/>
+                <a:uFillTx/>
+                <a:latin typeface="Calibri" panose="020F0502020204030204"/>
+                <a:ea typeface="+mn-ea"/>
+                <a:cs typeface="+mn-cs"/>
+              </a:rPr>
+              <a:t>During the test you will hear a series of three tones, after which you will be asked which one in this series was different from the others.</a:t>
+            </a:r>
+            <a:endParaRPr kumimoji="0" lang="en-DK" sz="3200" b="0" i="0" u="none" strike="noStrike" kern="1200" cap="none" spc="0" normalizeH="0" baseline="0" noProof="0" dirty="0">
+              <a:ln>
+                <a:noFill/>
+              </a:ln>
+              <a:solidFill>
+                <a:prstClr val="white"/>
+              </a:solidFill>
+              <a:effectLst/>
+              <a:uLnTx/>
+              <a:uFillTx/>
+              <a:latin typeface="Calibri" panose="020F0502020204030204"/>
+              <a:ea typeface="+mn-ea"/>
+              <a:cs typeface="+mn-cs"/>
+            </a:endParaRPr>
+          </a:p>
+        </p:txBody>
+      </p:sp>
+      <p:pic>
+        <p:nvPicPr>
+          <p:cNvPr id="3" name="Picture 2">
+            <a:extLst>
+              <a:ext uri="{FF2B5EF4-FFF2-40B4-BE49-F238E27FC236}">
+                <a16:creationId xmlns:a16="http://schemas.microsoft.com/office/drawing/2014/main" id="{C669940E-EAE9-8091-9A71-656FB4AE2865}"/>
+              </a:ext>
+            </a:extLst>
+          </p:cNvPr>
+          <p:cNvPicPr>
+            <a:picLocks noChangeAspect="1"/>
+          </p:cNvPicPr>
+          <p:nvPr/>
+        </p:nvPicPr>
+        <p:blipFill>
+          <a:blip r:embed="rId3"/>
+          <a:stretch>
+            <a:fillRect/>
+          </a:stretch>
+        </p:blipFill>
+        <p:spPr>
+          <a:xfrm>
+            <a:off x="1609228" y="2629968"/>
+            <a:ext cx="3553787" cy="1999005"/>
+          </a:xfrm>
+          <a:prstGeom prst="rect">
+            <a:avLst/>
+          </a:prstGeom>
+          <a:ln w="12700" cap="sq">
+            <a:solidFill>
+              <a:schemeClr val="tx1"/>
+            </a:solidFill>
+            <a:miter lim="800000"/>
+          </a:ln>
+          <a:effectLst>
+            <a:outerShdw blurRad="57150" dist="50800" dir="2700000" algn="tl" rotWithShape="0">
+              <a:srgbClr val="000000">
+                <a:alpha val="40000"/>
+              </a:srgbClr>
+            </a:outerShdw>
+          </a:effectLst>
+        </p:spPr>
+      </p:pic>
+      <p:pic>
+        <p:nvPicPr>
+          <p:cNvPr id="22" name="Picture 21">
+            <a:extLst>
+              <a:ext uri="{FF2B5EF4-FFF2-40B4-BE49-F238E27FC236}">
+                <a16:creationId xmlns:a16="http://schemas.microsoft.com/office/drawing/2014/main" id="{302A8DF2-5142-ED81-763E-8EA1E3F5FDEE}"/>
+              </a:ext>
+            </a:extLst>
+          </p:cNvPr>
+          <p:cNvPicPr>
+            <a:picLocks noChangeAspect="1"/>
+          </p:cNvPicPr>
+          <p:nvPr/>
+        </p:nvPicPr>
+        <p:blipFill>
+          <a:blip r:embed="rId4"/>
+          <a:stretch>
+            <a:fillRect/>
+          </a:stretch>
+        </p:blipFill>
+        <p:spPr>
+          <a:xfrm>
+            <a:off x="7084742" y="3025065"/>
+            <a:ext cx="2900575" cy="1603908"/>
+          </a:xfrm>
+          <a:prstGeom prst="rect">
+            <a:avLst/>
+          </a:prstGeom>
+          <a:ln w="12700" cap="sq">
+            <a:noFill/>
+            <a:miter lim="800000"/>
+          </a:ln>
+          <a:effectLst>
+            <a:outerShdw blurRad="57150" dist="50800" dir="2700000" algn="tl" rotWithShape="0">
+              <a:srgbClr val="000000">
+                <a:alpha val="40000"/>
+              </a:srgbClr>
+            </a:outerShdw>
+          </a:effectLst>
+        </p:spPr>
+      </p:pic>
+      <p:sp>
+        <p:nvSpPr>
+          <p:cNvPr id="23" name="Arrow: Right 22">
+            <a:extLst>
+              <a:ext uri="{FF2B5EF4-FFF2-40B4-BE49-F238E27FC236}">
+                <a16:creationId xmlns:a16="http://schemas.microsoft.com/office/drawing/2014/main" id="{1B59C880-2803-533A-FB2E-44B3B36FCF96}"/>
+              </a:ext>
+            </a:extLst>
+          </p:cNvPr>
+          <p:cNvSpPr/>
+          <p:nvPr/>
+        </p:nvSpPr>
+        <p:spPr>
+          <a:xfrm>
+            <a:off x="5498780" y="3267055"/>
+            <a:ext cx="1092820" cy="724830"/>
+          </a:xfrm>
+          <a:prstGeom prst="rightArrow">
+            <a:avLst/>
+          </a:prstGeom>
+          <a:solidFill>
+            <a:schemeClr val="tx1"/>
+          </a:solidFill>
+        </p:spPr>
+        <p:style>
+          <a:lnRef idx="2">
+            <a:schemeClr val="accent1">
+              <a:shade val="15000"/>
+            </a:schemeClr>
+          </a:lnRef>
+          <a:fillRef idx="1">
+            <a:schemeClr val="accent1"/>
+          </a:fillRef>
+          <a:effectRef idx="0">
+            <a:schemeClr val="accent1"/>
+          </a:effectRef>
+          <a:fontRef idx="minor">
+            <a:schemeClr val="lt1"/>
+          </a:fontRef>
+        </p:style>
+        <p:txBody>
+          <a:bodyPr rtlCol="0" anchor="ctr"/>
+          <a:lstStyle/>
+          <a:p>
+            <a:pPr marL="0" marR="0" lvl="0" indent="0" algn="ctr" defTabSz="914400" rtl="0" eaLnBrk="1" fontAlgn="auto" latinLnBrk="0" hangingPunct="1">
+              <a:lnSpc>
+                <a:spcPct val="100000"/>
+              </a:lnSpc>
+              <a:spcBef>
+                <a:spcPts val="0"/>
+              </a:spcBef>
+              <a:spcAft>
+                <a:spcPts val="0"/>
+              </a:spcAft>
+              <a:buClrTx/>
+              <a:buSzTx/>
+              <a:buFontTx/>
+              <a:buNone/>
+              <a:tabLst/>
+              <a:defRPr/>
+            </a:pPr>
+            <a:endParaRPr kumimoji="0" lang="en-DK" sz="1800" b="0" i="0" u="none" strike="noStrike" kern="1200" cap="none" spc="0" normalizeH="0" baseline="0" noProof="0">
+              <a:ln>
+                <a:noFill/>
+              </a:ln>
+              <a:solidFill>
+                <a:prstClr val="white"/>
+              </a:solidFill>
+              <a:effectLst/>
+              <a:uLnTx/>
+              <a:uFillTx/>
+              <a:latin typeface="Calibri" panose="020F0502020204030204"/>
+              <a:ea typeface="+mn-ea"/>
+              <a:cs typeface="+mn-cs"/>
+            </a:endParaRPr>
+          </a:p>
+        </p:txBody>
+      </p:sp>
+      <p:sp>
+        <p:nvSpPr>
+          <p:cNvPr id="24" name="TextBox 23">
+            <a:extLst>
+              <a:ext uri="{FF2B5EF4-FFF2-40B4-BE49-F238E27FC236}">
+                <a16:creationId xmlns:a16="http://schemas.microsoft.com/office/drawing/2014/main" id="{DA670937-6F62-9732-ACA3-2936E85A2F63}"/>
+              </a:ext>
+            </a:extLst>
+          </p:cNvPr>
+          <p:cNvSpPr txBox="1"/>
+          <p:nvPr/>
+        </p:nvSpPr>
+        <p:spPr>
+          <a:xfrm>
+            <a:off x="2098781" y="5064815"/>
+            <a:ext cx="2574679" cy="369332"/>
+          </a:xfrm>
+          <a:prstGeom prst="rect">
+            <a:avLst/>
+          </a:prstGeom>
+          <a:noFill/>
+        </p:spPr>
+        <p:txBody>
+          <a:bodyPr wrap="none" rtlCol="0">
+            <a:spAutoFit/>
+          </a:bodyPr>
+          <a:lstStyle/>
+          <a:p>
+            <a:pPr marL="0" marR="0" lvl="0" indent="0" algn="l" defTabSz="914400" rtl="0" eaLnBrk="1" fontAlgn="auto" latinLnBrk="0" hangingPunct="1">
+              <a:lnSpc>
+                <a:spcPct val="100000"/>
+              </a:lnSpc>
+              <a:spcBef>
+                <a:spcPts val="0"/>
+              </a:spcBef>
+              <a:spcAft>
+                <a:spcPts val="0"/>
+              </a:spcAft>
+              <a:buClrTx/>
+              <a:buSzTx/>
+              <a:buFontTx/>
+              <a:buNone/>
+              <a:tabLst/>
+              <a:defRPr/>
+            </a:pPr>
+            <a:r>
+              <a:rPr kumimoji="0" lang="en-GB" sz="1800" b="0" i="0" u="none" strike="noStrike" kern="1200" cap="none" spc="0" normalizeH="0" baseline="0" noProof="0" dirty="0">
+                <a:ln>
+                  <a:noFill/>
+                </a:ln>
+                <a:solidFill>
+                  <a:prstClr val="white"/>
+                </a:solidFill>
+                <a:effectLst/>
+                <a:uLnTx/>
+                <a:uFillTx/>
+                <a:latin typeface="Calibri" panose="020F0502020204030204"/>
+                <a:ea typeface="+mn-ea"/>
+                <a:cs typeface="+mn-cs"/>
+              </a:rPr>
+              <a:t>You will hear three tones.</a:t>
+            </a:r>
+            <a:endParaRPr kumimoji="0" lang="en-DK" sz="1800" b="0" i="0" u="none" strike="noStrike" kern="1200" cap="none" spc="0" normalizeH="0" baseline="0" noProof="0" dirty="0">
+              <a:ln>
+                <a:noFill/>
+              </a:ln>
+              <a:solidFill>
+                <a:prstClr val="white"/>
+              </a:solidFill>
+              <a:effectLst/>
+              <a:uLnTx/>
+              <a:uFillTx/>
+              <a:latin typeface="Calibri" panose="020F0502020204030204"/>
+              <a:ea typeface="+mn-ea"/>
+              <a:cs typeface="+mn-cs"/>
+            </a:endParaRPr>
+          </a:p>
+        </p:txBody>
+      </p:sp>
+      <p:sp>
+        <p:nvSpPr>
+          <p:cNvPr id="25" name="TextBox 24">
+            <a:extLst>
+              <a:ext uri="{FF2B5EF4-FFF2-40B4-BE49-F238E27FC236}">
+                <a16:creationId xmlns:a16="http://schemas.microsoft.com/office/drawing/2014/main" id="{4AF08D86-E6B7-AECA-4A90-9B3E94EE0BDF}"/>
+              </a:ext>
+            </a:extLst>
+          </p:cNvPr>
+          <p:cNvSpPr txBox="1"/>
+          <p:nvPr/>
+        </p:nvSpPr>
+        <p:spPr>
+          <a:xfrm>
+            <a:off x="6823288" y="5064815"/>
+            <a:ext cx="3615084" cy="923330"/>
+          </a:xfrm>
+          <a:prstGeom prst="rect">
+            <a:avLst/>
+          </a:prstGeom>
+          <a:noFill/>
+        </p:spPr>
+        <p:txBody>
+          <a:bodyPr wrap="square" rtlCol="0">
+            <a:spAutoFit/>
+          </a:bodyPr>
+          <a:lstStyle/>
+          <a:p>
+            <a:pPr marL="0" marR="0" lvl="0" indent="0" algn="l" defTabSz="914400" rtl="0" eaLnBrk="1" fontAlgn="auto" latinLnBrk="0" hangingPunct="1">
+              <a:lnSpc>
+                <a:spcPct val="100000"/>
+              </a:lnSpc>
+              <a:spcBef>
+                <a:spcPts val="0"/>
+              </a:spcBef>
+              <a:spcAft>
+                <a:spcPts val="0"/>
+              </a:spcAft>
+              <a:buClrTx/>
+              <a:buSzTx/>
+              <a:buFontTx/>
+              <a:buNone/>
+              <a:tabLst/>
+              <a:defRPr/>
+            </a:pPr>
+            <a:r>
+              <a:rPr kumimoji="0" lang="en-GB" sz="1800" b="0" i="0" u="none" strike="noStrike" kern="1200" cap="none" spc="0" normalizeH="0" baseline="0" noProof="0" dirty="0">
+                <a:ln>
+                  <a:noFill/>
+                </a:ln>
+                <a:solidFill>
+                  <a:prstClr val="white"/>
+                </a:solidFill>
+                <a:effectLst/>
+                <a:uLnTx/>
+                <a:uFillTx/>
+                <a:latin typeface="Calibri" panose="020F0502020204030204"/>
+                <a:ea typeface="+mn-ea"/>
+                <a:cs typeface="+mn-cs"/>
+              </a:rPr>
+              <a:t>Press the button on the joystick that match the pattern of tones you heard.</a:t>
+            </a:r>
+            <a:endParaRPr kumimoji="0" lang="en-DK" sz="1800" b="0" i="0" u="none" strike="noStrike" kern="1200" cap="none" spc="0" normalizeH="0" baseline="0" noProof="0" dirty="0">
+              <a:ln>
+                <a:noFill/>
+              </a:ln>
+              <a:solidFill>
+                <a:prstClr val="white"/>
+              </a:solidFill>
+              <a:effectLst/>
+              <a:uLnTx/>
+              <a:uFillTx/>
+              <a:latin typeface="Calibri" panose="020F0502020204030204"/>
+              <a:ea typeface="+mn-ea"/>
+              <a:cs typeface="+mn-cs"/>
+            </a:endParaRPr>
+          </a:p>
+        </p:txBody>
+      </p:sp>
+      <p:sp>
+        <p:nvSpPr>
+          <p:cNvPr id="26" name="Rectangle 25">
+            <a:extLst>
+              <a:ext uri="{FF2B5EF4-FFF2-40B4-BE49-F238E27FC236}">
+                <a16:creationId xmlns:a16="http://schemas.microsoft.com/office/drawing/2014/main" id="{FB6D19E3-7BE2-58FF-5D31-F67DDF4A3D35}"/>
+              </a:ext>
+            </a:extLst>
+          </p:cNvPr>
+          <p:cNvSpPr/>
+          <p:nvPr/>
+        </p:nvSpPr>
+        <p:spPr>
+          <a:xfrm>
+            <a:off x="6727486" y="2629968"/>
+            <a:ext cx="3710885" cy="1999005"/>
+          </a:xfrm>
+          <a:prstGeom prst="rect">
+            <a:avLst/>
+          </a:prstGeom>
+          <a:noFill/>
+          <a:ln w="12700">
+            <a:solidFill>
+              <a:schemeClr val="tx1"/>
+            </a:solidFill>
+          </a:ln>
+        </p:spPr>
+        <p:style>
+          <a:lnRef idx="2">
+            <a:schemeClr val="accent1">
+              <a:shade val="15000"/>
+            </a:schemeClr>
+          </a:lnRef>
+          <a:fillRef idx="1">
+            <a:schemeClr val="accent1"/>
+          </a:fillRef>
+          <a:effectRef idx="0">
+            <a:schemeClr val="accent1"/>
+          </a:effectRef>
+          <a:fontRef idx="minor">
+            <a:schemeClr val="lt1"/>
+          </a:fontRef>
+        </p:style>
+        <p:txBody>
+          <a:bodyPr rtlCol="0" anchor="ctr"/>
+          <a:lstStyle/>
+          <a:p>
+            <a:pPr marL="0" marR="0" lvl="0" indent="0" algn="ctr" defTabSz="914400" rtl="0" eaLnBrk="1" fontAlgn="auto" latinLnBrk="0" hangingPunct="1">
+              <a:lnSpc>
+                <a:spcPct val="100000"/>
+              </a:lnSpc>
+              <a:spcBef>
+                <a:spcPts val="0"/>
+              </a:spcBef>
+              <a:spcAft>
+                <a:spcPts val="0"/>
+              </a:spcAft>
+              <a:buClrTx/>
+              <a:buSzTx/>
+              <a:buFontTx/>
+              <a:buNone/>
+              <a:tabLst/>
+              <a:defRPr/>
+            </a:pPr>
+            <a:endParaRPr kumimoji="0" lang="en-DK" sz="1800" b="0" i="0" u="none" strike="noStrike" kern="1200" cap="none" spc="0" normalizeH="0" baseline="0" noProof="0">
+              <a:ln>
+                <a:noFill/>
+              </a:ln>
+              <a:solidFill>
+                <a:prstClr val="white"/>
+              </a:solidFill>
+              <a:effectLst/>
+              <a:uLnTx/>
+              <a:uFillTx/>
+              <a:latin typeface="Calibri" panose="020F0502020204030204"/>
+              <a:ea typeface="+mn-ea"/>
+              <a:cs typeface="+mn-cs"/>
+            </a:endParaRPr>
+          </a:p>
+        </p:txBody>
+      </p:sp>
+    </p:spTree>
+    <p:extLst>
+      <p:ext uri="{BB962C8B-B14F-4D97-AF65-F5344CB8AC3E}">
+        <p14:creationId xmlns:p14="http://schemas.microsoft.com/office/powerpoint/2010/main" val="1407172407"/>
+      </p:ext>
+    </p:extLst>
+  </p:cSld>
+  <p:clrMapOvr>
+    <a:masterClrMapping/>
+  </p:clrMapOvr>
+</p:sld>
+</file>
+
+<file path=ppt/slides/slide13.xml><?xml version="1.0" encoding="utf-8"?>
+<p:sld xmlns:a="http://schemas.openxmlformats.org/drawingml/2006/main" xmlns:r="http://schemas.openxmlformats.org/officeDocument/2006/relationships" xmlns:p="http://schemas.openxmlformats.org/presentationml/2006/main">
+  <p:cSld>
+    <p:spTree>
+      <p:nvGrpSpPr>
+        <p:cNvPr id="1" name=""/>
+        <p:cNvGrpSpPr/>
+        <p:nvPr/>
+      </p:nvGrpSpPr>
+      <p:grpSpPr>
+        <a:xfrm>
+          <a:off x="0" y="0"/>
+          <a:ext cx="0" cy="0"/>
+          <a:chOff x="0" y="0"/>
+          <a:chExt cx="0" cy="0"/>
+        </a:xfrm>
+      </p:grpSpPr>
+      <p:sp>
+        <p:nvSpPr>
+          <p:cNvPr id="2" name="TextBox 1">
+            <a:extLst>
+              <a:ext uri="{FF2B5EF4-FFF2-40B4-BE49-F238E27FC236}">
+                <a16:creationId xmlns:a16="http://schemas.microsoft.com/office/drawing/2014/main" id="{CE301087-9B3F-3BA1-F3E7-075B023A2E82}"/>
+              </a:ext>
+            </a:extLst>
+          </p:cNvPr>
+          <p:cNvSpPr txBox="1"/>
+          <p:nvPr/>
+        </p:nvSpPr>
+        <p:spPr>
+          <a:xfrm>
+            <a:off x="669074" y="446048"/>
+            <a:ext cx="10370633" cy="1569660"/>
+          </a:xfrm>
+          <a:prstGeom prst="rect">
+            <a:avLst/>
+          </a:prstGeom>
+          <a:noFill/>
+        </p:spPr>
+        <p:txBody>
+          <a:bodyPr wrap="square" rtlCol="0">
+            <a:spAutoFit/>
+          </a:bodyPr>
+          <a:lstStyle/>
+          <a:p>
+            <a:pPr marL="0" marR="0" lvl="0" indent="0" algn="just" defTabSz="914400" rtl="0" eaLnBrk="1" fontAlgn="auto" latinLnBrk="0" hangingPunct="1">
+              <a:lnSpc>
+                <a:spcPct val="100000"/>
+              </a:lnSpc>
+              <a:spcBef>
+                <a:spcPts val="0"/>
+              </a:spcBef>
+              <a:spcAft>
+                <a:spcPts val="0"/>
+              </a:spcAft>
+              <a:buClrTx/>
+              <a:buSzTx/>
+              <a:buFontTx/>
+              <a:buNone/>
+              <a:tabLst/>
+              <a:defRPr/>
+            </a:pPr>
+            <a:r>
+              <a:rPr kumimoji="0" lang="en-GB" sz="3200" b="0" i="0" u="none" strike="noStrike" kern="1200" cap="none" spc="0" normalizeH="0" baseline="0" noProof="0" dirty="0">
+                <a:ln>
+                  <a:noFill/>
+                </a:ln>
+                <a:solidFill>
+                  <a:prstClr val="white"/>
+                </a:solidFill>
+                <a:effectLst/>
+                <a:uLnTx/>
+                <a:uFillTx/>
+                <a:latin typeface="Calibri" panose="020F0502020204030204"/>
+                <a:ea typeface="+mn-ea"/>
+                <a:cs typeface="+mn-cs"/>
+              </a:rPr>
+              <a:t>During the test you will hear see a series of cues on the screen. Your task is to select the cue at which you heard a tone.</a:t>
+            </a:r>
+            <a:endParaRPr kumimoji="0" lang="en-DK" sz="3200" b="0" i="0" u="none" strike="noStrike" kern="1200" cap="none" spc="0" normalizeH="0" baseline="0" noProof="0" dirty="0">
+              <a:ln>
+                <a:noFill/>
+              </a:ln>
+              <a:solidFill>
+                <a:prstClr val="white"/>
+              </a:solidFill>
+              <a:effectLst/>
+              <a:uLnTx/>
+              <a:uFillTx/>
+              <a:latin typeface="Calibri" panose="020F0502020204030204"/>
+              <a:ea typeface="+mn-ea"/>
+              <a:cs typeface="+mn-cs"/>
+            </a:endParaRPr>
+          </a:p>
+        </p:txBody>
+      </p:sp>
+      <p:sp>
+        <p:nvSpPr>
+          <p:cNvPr id="5" name="Rectangle 4">
+            <a:extLst>
+              <a:ext uri="{FF2B5EF4-FFF2-40B4-BE49-F238E27FC236}">
+                <a16:creationId xmlns:a16="http://schemas.microsoft.com/office/drawing/2014/main" id="{097B02D3-DC36-B549-C240-F3E1CBF7D0FA}"/>
+              </a:ext>
+            </a:extLst>
+          </p:cNvPr>
+          <p:cNvSpPr/>
+          <p:nvPr/>
+        </p:nvSpPr>
+        <p:spPr>
+          <a:xfrm>
+            <a:off x="1271240" y="2341756"/>
+            <a:ext cx="1572322" cy="1326995"/>
+          </a:xfrm>
+          <a:prstGeom prst="rect">
+            <a:avLst/>
+          </a:prstGeom>
+          <a:noFill/>
+          <a:ln>
+            <a:solidFill>
+              <a:schemeClr val="tx1"/>
+            </a:solidFill>
+          </a:ln>
+        </p:spPr>
+        <p:style>
+          <a:lnRef idx="2">
+            <a:schemeClr val="accent1">
+              <a:shade val="15000"/>
+            </a:schemeClr>
+          </a:lnRef>
+          <a:fillRef idx="1">
+            <a:schemeClr val="accent1"/>
+          </a:fillRef>
+          <a:effectRef idx="0">
+            <a:schemeClr val="accent1"/>
+          </a:effectRef>
+          <a:fontRef idx="minor">
+            <a:schemeClr val="lt1"/>
+          </a:fontRef>
+        </p:style>
+        <p:txBody>
+          <a:bodyPr rtlCol="0" anchor="ctr"/>
+          <a:lstStyle/>
+          <a:p>
+            <a:pPr marL="0" marR="0" lvl="0" indent="0" algn="ctr" defTabSz="914400" rtl="0" eaLnBrk="1" fontAlgn="auto" latinLnBrk="0" hangingPunct="1">
+              <a:lnSpc>
+                <a:spcPct val="100000"/>
+              </a:lnSpc>
+              <a:spcBef>
+                <a:spcPts val="0"/>
+              </a:spcBef>
+              <a:spcAft>
+                <a:spcPts val="0"/>
+              </a:spcAft>
+              <a:buClrTx/>
+              <a:buSzTx/>
+              <a:buFontTx/>
+              <a:buNone/>
+              <a:tabLst/>
+              <a:defRPr/>
+            </a:pPr>
+            <a:r>
+              <a:rPr kumimoji="0" lang="en-GB" sz="4000" b="0" i="0" u="none" strike="noStrike" kern="1200" cap="none" spc="0" normalizeH="0" baseline="0" noProof="0" dirty="0">
+                <a:ln>
+                  <a:noFill/>
+                </a:ln>
+                <a:solidFill>
+                  <a:prstClr val="white"/>
+                </a:solidFill>
+                <a:effectLst/>
+                <a:uLnTx/>
+                <a:uFillTx/>
+                <a:latin typeface="Calibri" panose="020F0502020204030204"/>
+                <a:ea typeface="+mn-ea"/>
+                <a:cs typeface="+mn-cs"/>
+              </a:rPr>
+              <a:t>1</a:t>
+            </a:r>
+            <a:endParaRPr kumimoji="0" lang="en-DK" sz="4000" b="0" i="0" u="none" strike="noStrike" kern="1200" cap="none" spc="0" normalizeH="0" baseline="0" noProof="0" dirty="0">
+              <a:ln>
+                <a:noFill/>
+              </a:ln>
+              <a:solidFill>
+                <a:prstClr val="white"/>
+              </a:solidFill>
+              <a:effectLst/>
+              <a:uLnTx/>
+              <a:uFillTx/>
+              <a:latin typeface="Calibri" panose="020F0502020204030204"/>
+              <a:ea typeface="+mn-ea"/>
+              <a:cs typeface="+mn-cs"/>
+            </a:endParaRPr>
+          </a:p>
+        </p:txBody>
+      </p:sp>
+      <p:sp>
+        <p:nvSpPr>
+          <p:cNvPr id="6" name="Rectangle 5">
+            <a:extLst>
+              <a:ext uri="{FF2B5EF4-FFF2-40B4-BE49-F238E27FC236}">
+                <a16:creationId xmlns:a16="http://schemas.microsoft.com/office/drawing/2014/main" id="{F3FDD619-F2DA-087F-A4A0-922139D697D6}"/>
+              </a:ext>
+            </a:extLst>
+          </p:cNvPr>
+          <p:cNvSpPr/>
+          <p:nvPr/>
+        </p:nvSpPr>
+        <p:spPr>
+          <a:xfrm>
+            <a:off x="3895494" y="2341756"/>
+            <a:ext cx="1572322" cy="1326995"/>
+          </a:xfrm>
+          <a:prstGeom prst="rect">
+            <a:avLst/>
+          </a:prstGeom>
+          <a:noFill/>
+          <a:ln>
+            <a:solidFill>
+              <a:schemeClr val="tx1"/>
+            </a:solidFill>
+          </a:ln>
+        </p:spPr>
+        <p:style>
+          <a:lnRef idx="2">
+            <a:schemeClr val="accent1">
+              <a:shade val="15000"/>
+            </a:schemeClr>
+          </a:lnRef>
+          <a:fillRef idx="1">
+            <a:schemeClr val="accent1"/>
+          </a:fillRef>
+          <a:effectRef idx="0">
+            <a:schemeClr val="accent1"/>
+          </a:effectRef>
+          <a:fontRef idx="minor">
+            <a:schemeClr val="lt1"/>
+          </a:fontRef>
+        </p:style>
+        <p:txBody>
+          <a:bodyPr rtlCol="0" anchor="ctr"/>
+          <a:lstStyle/>
+          <a:p>
+            <a:pPr marL="0" marR="0" lvl="0" indent="0" algn="ctr" defTabSz="914400" rtl="0" eaLnBrk="1" fontAlgn="auto" latinLnBrk="0" hangingPunct="1">
+              <a:lnSpc>
+                <a:spcPct val="100000"/>
+              </a:lnSpc>
+              <a:spcBef>
+                <a:spcPts val="0"/>
+              </a:spcBef>
+              <a:spcAft>
+                <a:spcPts val="0"/>
+              </a:spcAft>
+              <a:buClrTx/>
+              <a:buSzTx/>
+              <a:buFontTx/>
+              <a:buNone/>
+              <a:tabLst/>
+              <a:defRPr/>
+            </a:pPr>
+            <a:r>
+              <a:rPr kumimoji="0" lang="en-GB" sz="4000" b="0" i="0" u="none" strike="noStrike" kern="1200" cap="none" spc="0" normalizeH="0" baseline="0" noProof="0" dirty="0">
+                <a:ln>
+                  <a:noFill/>
+                </a:ln>
+                <a:solidFill>
+                  <a:prstClr val="white"/>
+                </a:solidFill>
+                <a:effectLst/>
+                <a:uLnTx/>
+                <a:uFillTx/>
+                <a:latin typeface="Calibri" panose="020F0502020204030204"/>
+                <a:ea typeface="+mn-ea"/>
+                <a:cs typeface="+mn-cs"/>
+              </a:rPr>
+              <a:t>2</a:t>
+            </a:r>
+            <a:endParaRPr kumimoji="0" lang="en-DK" sz="4000" b="0" i="0" u="none" strike="noStrike" kern="1200" cap="none" spc="0" normalizeH="0" baseline="0" noProof="0" dirty="0">
+              <a:ln>
+                <a:noFill/>
+              </a:ln>
+              <a:solidFill>
+                <a:prstClr val="white"/>
+              </a:solidFill>
+              <a:effectLst/>
+              <a:uLnTx/>
+              <a:uFillTx/>
+              <a:latin typeface="Calibri" panose="020F0502020204030204"/>
+              <a:ea typeface="+mn-ea"/>
+              <a:cs typeface="+mn-cs"/>
+            </a:endParaRPr>
+          </a:p>
+        </p:txBody>
+      </p:sp>
+      <p:sp>
+        <p:nvSpPr>
+          <p:cNvPr id="7" name="Rectangle 6">
+            <a:extLst>
+              <a:ext uri="{FF2B5EF4-FFF2-40B4-BE49-F238E27FC236}">
+                <a16:creationId xmlns:a16="http://schemas.microsoft.com/office/drawing/2014/main" id="{C7732D02-111A-ACCB-002D-2B95F1244A46}"/>
+              </a:ext>
+            </a:extLst>
+          </p:cNvPr>
+          <p:cNvSpPr/>
+          <p:nvPr/>
+        </p:nvSpPr>
+        <p:spPr>
+          <a:xfrm>
+            <a:off x="6519748" y="2341756"/>
+            <a:ext cx="1572322" cy="1326995"/>
+          </a:xfrm>
+          <a:prstGeom prst="rect">
+            <a:avLst/>
+          </a:prstGeom>
+          <a:noFill/>
+          <a:ln>
+            <a:solidFill>
+              <a:schemeClr val="tx1"/>
+            </a:solidFill>
+          </a:ln>
+        </p:spPr>
+        <p:style>
+          <a:lnRef idx="2">
+            <a:schemeClr val="accent1">
+              <a:shade val="15000"/>
+            </a:schemeClr>
+          </a:lnRef>
+          <a:fillRef idx="1">
+            <a:schemeClr val="accent1"/>
+          </a:fillRef>
+          <a:effectRef idx="0">
+            <a:schemeClr val="accent1"/>
+          </a:effectRef>
+          <a:fontRef idx="minor">
+            <a:schemeClr val="lt1"/>
+          </a:fontRef>
+        </p:style>
+        <p:txBody>
+          <a:bodyPr rtlCol="0" anchor="ctr"/>
+          <a:lstStyle/>
+          <a:p>
+            <a:pPr marL="0" marR="0" lvl="0" indent="0" algn="ctr" defTabSz="914400" rtl="0" eaLnBrk="1" fontAlgn="auto" latinLnBrk="0" hangingPunct="1">
+              <a:lnSpc>
+                <a:spcPct val="100000"/>
+              </a:lnSpc>
+              <a:spcBef>
+                <a:spcPts val="0"/>
+              </a:spcBef>
+              <a:spcAft>
+                <a:spcPts val="0"/>
+              </a:spcAft>
+              <a:buClrTx/>
+              <a:buSzTx/>
+              <a:buFontTx/>
+              <a:buNone/>
+              <a:tabLst/>
+              <a:defRPr/>
+            </a:pPr>
+            <a:r>
+              <a:rPr kumimoji="0" lang="en-GB" sz="4000" b="0" i="0" u="none" strike="noStrike" kern="1200" cap="none" spc="0" normalizeH="0" baseline="0" noProof="0" dirty="0">
+                <a:ln>
+                  <a:noFill/>
+                </a:ln>
+                <a:solidFill>
+                  <a:prstClr val="white"/>
+                </a:solidFill>
+                <a:effectLst/>
+                <a:uLnTx/>
+                <a:uFillTx/>
+                <a:latin typeface="Calibri" panose="020F0502020204030204"/>
+                <a:ea typeface="+mn-ea"/>
+                <a:cs typeface="+mn-cs"/>
+              </a:rPr>
+              <a:t>3</a:t>
+            </a:r>
+            <a:endParaRPr kumimoji="0" lang="en-DK" sz="4000" b="0" i="0" u="none" strike="noStrike" kern="1200" cap="none" spc="0" normalizeH="0" baseline="0" noProof="0" dirty="0">
+              <a:ln>
+                <a:noFill/>
+              </a:ln>
+              <a:solidFill>
+                <a:prstClr val="white"/>
+              </a:solidFill>
+              <a:effectLst/>
+              <a:uLnTx/>
+              <a:uFillTx/>
+              <a:latin typeface="Calibri" panose="020F0502020204030204"/>
+              <a:ea typeface="+mn-ea"/>
+              <a:cs typeface="+mn-cs"/>
+            </a:endParaRPr>
+          </a:p>
+        </p:txBody>
+      </p:sp>
+      <p:sp>
+        <p:nvSpPr>
+          <p:cNvPr id="8" name="Rectangle 7">
+            <a:extLst>
+              <a:ext uri="{FF2B5EF4-FFF2-40B4-BE49-F238E27FC236}">
+                <a16:creationId xmlns:a16="http://schemas.microsoft.com/office/drawing/2014/main" id="{06285A9B-EAD7-F25C-90E4-43F1D32AF11C}"/>
+              </a:ext>
+            </a:extLst>
+          </p:cNvPr>
+          <p:cNvSpPr/>
+          <p:nvPr/>
+        </p:nvSpPr>
+        <p:spPr>
+          <a:xfrm>
+            <a:off x="9144001" y="2341755"/>
+            <a:ext cx="1572322" cy="1326995"/>
+          </a:xfrm>
+          <a:prstGeom prst="rect">
+            <a:avLst/>
+          </a:prstGeom>
+          <a:noFill/>
+          <a:ln>
+            <a:solidFill>
+              <a:schemeClr val="tx1"/>
+            </a:solidFill>
+          </a:ln>
+        </p:spPr>
+        <p:style>
+          <a:lnRef idx="2">
+            <a:schemeClr val="accent1">
+              <a:shade val="15000"/>
+            </a:schemeClr>
+          </a:lnRef>
+          <a:fillRef idx="1">
+            <a:schemeClr val="accent1"/>
+          </a:fillRef>
+          <a:effectRef idx="0">
+            <a:schemeClr val="accent1"/>
+          </a:effectRef>
+          <a:fontRef idx="minor">
+            <a:schemeClr val="lt1"/>
+          </a:fontRef>
+        </p:style>
+        <p:txBody>
+          <a:bodyPr rtlCol="0" anchor="ctr"/>
+          <a:lstStyle/>
+          <a:p>
+            <a:pPr marL="0" marR="0" lvl="0" indent="0" algn="ctr" defTabSz="914400" rtl="0" eaLnBrk="1" fontAlgn="auto" latinLnBrk="0" hangingPunct="1">
+              <a:lnSpc>
+                <a:spcPct val="100000"/>
+              </a:lnSpc>
+              <a:spcBef>
+                <a:spcPts val="0"/>
+              </a:spcBef>
+              <a:spcAft>
+                <a:spcPts val="0"/>
+              </a:spcAft>
+              <a:buClrTx/>
+              <a:buSzTx/>
+              <a:buFontTx/>
+              <a:buNone/>
+              <a:tabLst/>
+              <a:defRPr/>
+            </a:pPr>
+            <a:r>
+              <a:rPr kumimoji="0" lang="en-GB" sz="4000" b="0" i="0" u="none" strike="noStrike" kern="1200" cap="none" spc="0" normalizeH="0" baseline="0" noProof="0" dirty="0">
+                <a:ln>
+                  <a:noFill/>
+                </a:ln>
+                <a:solidFill>
+                  <a:prstClr val="white"/>
+                </a:solidFill>
+                <a:effectLst/>
+                <a:uLnTx/>
+                <a:uFillTx/>
+                <a:latin typeface="Calibri" panose="020F0502020204030204"/>
+                <a:ea typeface="+mn-ea"/>
+                <a:cs typeface="+mn-cs"/>
+              </a:rPr>
+              <a:t>4</a:t>
+            </a:r>
+            <a:endParaRPr kumimoji="0" lang="en-DK" sz="4000" b="0" i="0" u="none" strike="noStrike" kern="1200" cap="none" spc="0" normalizeH="0" baseline="0" noProof="0" dirty="0">
+              <a:ln>
+                <a:noFill/>
+              </a:ln>
+              <a:solidFill>
+                <a:prstClr val="white"/>
+              </a:solidFill>
+              <a:effectLst/>
+              <a:uLnTx/>
+              <a:uFillTx/>
+              <a:latin typeface="Calibri" panose="020F0502020204030204"/>
+              <a:ea typeface="+mn-ea"/>
+              <a:cs typeface="+mn-cs"/>
+            </a:endParaRPr>
+          </a:p>
+        </p:txBody>
+      </p:sp>
+      <p:pic>
+        <p:nvPicPr>
+          <p:cNvPr id="9" name="Picture 8">
+            <a:extLst>
+              <a:ext uri="{FF2B5EF4-FFF2-40B4-BE49-F238E27FC236}">
+                <a16:creationId xmlns:a16="http://schemas.microsoft.com/office/drawing/2014/main" id="{C243FAF6-56E1-8736-FDCA-8C0E3761651B}"/>
+              </a:ext>
+            </a:extLst>
+          </p:cNvPr>
+          <p:cNvPicPr>
+            <a:picLocks noChangeAspect="1"/>
+          </p:cNvPicPr>
+          <p:nvPr/>
+        </p:nvPicPr>
+        <p:blipFill>
+          <a:blip r:embed="rId3"/>
+          <a:stretch>
+            <a:fillRect/>
+          </a:stretch>
+        </p:blipFill>
+        <p:spPr>
+          <a:xfrm>
+            <a:off x="4414471" y="4629352"/>
+            <a:ext cx="3618944" cy="1506481"/>
+          </a:xfrm>
+          <a:prstGeom prst="rect">
+            <a:avLst/>
+          </a:prstGeom>
+        </p:spPr>
+      </p:pic>
+      <p:sp>
+        <p:nvSpPr>
+          <p:cNvPr id="10" name="Rectangle 9">
+            <a:extLst>
+              <a:ext uri="{FF2B5EF4-FFF2-40B4-BE49-F238E27FC236}">
+                <a16:creationId xmlns:a16="http://schemas.microsoft.com/office/drawing/2014/main" id="{2E2D3560-3334-AE12-A60B-25C21303C93A}"/>
+              </a:ext>
+            </a:extLst>
+          </p:cNvPr>
+          <p:cNvSpPr/>
+          <p:nvPr/>
+        </p:nvSpPr>
+        <p:spPr>
+          <a:xfrm>
+            <a:off x="4414471" y="4516244"/>
+            <a:ext cx="3363057" cy="1895708"/>
+          </a:xfrm>
+          <a:prstGeom prst="rect">
+            <a:avLst/>
+          </a:prstGeom>
+          <a:noFill/>
+          <a:ln>
+            <a:solidFill>
+              <a:schemeClr val="tx1"/>
+            </a:solidFill>
+          </a:ln>
+        </p:spPr>
+        <p:style>
+          <a:lnRef idx="2">
+            <a:schemeClr val="accent1">
+              <a:shade val="15000"/>
+            </a:schemeClr>
+          </a:lnRef>
+          <a:fillRef idx="1">
+            <a:schemeClr val="accent1"/>
+          </a:fillRef>
+          <a:effectRef idx="0">
+            <a:schemeClr val="accent1"/>
+          </a:effectRef>
+          <a:fontRef idx="minor">
+            <a:schemeClr val="lt1"/>
+          </a:fontRef>
+        </p:style>
+        <p:txBody>
+          <a:bodyPr rtlCol="0" anchor="ctr"/>
+          <a:lstStyle/>
+          <a:p>
+            <a:pPr marL="0" marR="0" lvl="0" indent="0" algn="ctr" defTabSz="914400" rtl="0" eaLnBrk="1" fontAlgn="auto" latinLnBrk="0" hangingPunct="1">
+              <a:lnSpc>
+                <a:spcPct val="100000"/>
+              </a:lnSpc>
+              <a:spcBef>
+                <a:spcPts val="0"/>
+              </a:spcBef>
+              <a:spcAft>
+                <a:spcPts val="0"/>
+              </a:spcAft>
+              <a:buClrTx/>
+              <a:buSzTx/>
+              <a:buFontTx/>
+              <a:buNone/>
+              <a:tabLst/>
+              <a:defRPr/>
+            </a:pPr>
+            <a:endParaRPr kumimoji="0" lang="en-DK" sz="1800" b="0" i="0" u="none" strike="noStrike" kern="1200" cap="none" spc="0" normalizeH="0" baseline="0" noProof="0">
+              <a:ln>
+                <a:noFill/>
+              </a:ln>
+              <a:solidFill>
+                <a:prstClr val="white"/>
+              </a:solidFill>
+              <a:effectLst/>
+              <a:uLnTx/>
+              <a:uFillTx/>
+              <a:latin typeface="Calibri" panose="020F0502020204030204"/>
+              <a:ea typeface="+mn-ea"/>
+              <a:cs typeface="+mn-cs"/>
+            </a:endParaRPr>
+          </a:p>
+        </p:txBody>
+      </p:sp>
+      <p:sp>
+        <p:nvSpPr>
+          <p:cNvPr id="11" name="Arrow: Down 10">
+            <a:extLst>
+              <a:ext uri="{FF2B5EF4-FFF2-40B4-BE49-F238E27FC236}">
+                <a16:creationId xmlns:a16="http://schemas.microsoft.com/office/drawing/2014/main" id="{81D6B1E6-9546-2B52-DD08-65A8AC2A17FE}"/>
+              </a:ext>
+            </a:extLst>
+          </p:cNvPr>
+          <p:cNvSpPr/>
+          <p:nvPr/>
+        </p:nvSpPr>
+        <p:spPr>
+          <a:xfrm>
+            <a:off x="5675971" y="3909833"/>
+            <a:ext cx="1025912" cy="506062"/>
+          </a:xfrm>
+          <a:prstGeom prst="downArrow">
+            <a:avLst/>
+          </a:prstGeom>
+          <a:solidFill>
+            <a:schemeClr val="tx1"/>
+          </a:solidFill>
+        </p:spPr>
+        <p:style>
+          <a:lnRef idx="2">
+            <a:schemeClr val="accent1">
+              <a:shade val="15000"/>
+            </a:schemeClr>
+          </a:lnRef>
+          <a:fillRef idx="1">
+            <a:schemeClr val="accent1"/>
+          </a:fillRef>
+          <a:effectRef idx="0">
+            <a:schemeClr val="accent1"/>
+          </a:effectRef>
+          <a:fontRef idx="minor">
+            <a:schemeClr val="lt1"/>
+          </a:fontRef>
+        </p:style>
+        <p:txBody>
+          <a:bodyPr rtlCol="0" anchor="ctr"/>
+          <a:lstStyle/>
+          <a:p>
+            <a:pPr marL="0" marR="0" lvl="0" indent="0" algn="ctr" defTabSz="914400" rtl="0" eaLnBrk="1" fontAlgn="auto" latinLnBrk="0" hangingPunct="1">
+              <a:lnSpc>
+                <a:spcPct val="100000"/>
+              </a:lnSpc>
+              <a:spcBef>
+                <a:spcPts val="0"/>
+              </a:spcBef>
+              <a:spcAft>
+                <a:spcPts val="0"/>
+              </a:spcAft>
+              <a:buClrTx/>
+              <a:buSzTx/>
+              <a:buFontTx/>
+              <a:buNone/>
+              <a:tabLst/>
+              <a:defRPr/>
+            </a:pPr>
+            <a:endParaRPr kumimoji="0" lang="en-DK" sz="1800" b="0" i="0" u="none" strike="noStrike" kern="1200" cap="none" spc="0" normalizeH="0" baseline="0" noProof="0">
+              <a:ln>
+                <a:noFill/>
+              </a:ln>
+              <a:solidFill>
+                <a:prstClr val="white"/>
+              </a:solidFill>
+              <a:effectLst/>
+              <a:uLnTx/>
+              <a:uFillTx/>
+              <a:latin typeface="Calibri" panose="020F0502020204030204"/>
+              <a:ea typeface="+mn-ea"/>
+              <a:cs typeface="+mn-cs"/>
+            </a:endParaRPr>
+          </a:p>
+        </p:txBody>
+      </p:sp>
+      <p:sp>
+        <p:nvSpPr>
+          <p:cNvPr id="12" name="Arrow: Right 11">
+            <a:extLst>
+              <a:ext uri="{FF2B5EF4-FFF2-40B4-BE49-F238E27FC236}">
+                <a16:creationId xmlns:a16="http://schemas.microsoft.com/office/drawing/2014/main" id="{71F81802-E70F-10DC-5D65-615E51DEF3B5}"/>
+              </a:ext>
+            </a:extLst>
+          </p:cNvPr>
+          <p:cNvSpPr/>
+          <p:nvPr/>
+        </p:nvSpPr>
+        <p:spPr>
+          <a:xfrm>
+            <a:off x="3159515" y="2795499"/>
+            <a:ext cx="490653" cy="412595"/>
+          </a:xfrm>
+          <a:prstGeom prst="rightArrow">
+            <a:avLst/>
+          </a:prstGeom>
+          <a:solidFill>
+            <a:schemeClr val="tx1"/>
+          </a:solidFill>
+          <a:ln>
+            <a:solidFill>
+              <a:schemeClr val="tx1"/>
+            </a:solidFill>
+          </a:ln>
+        </p:spPr>
+        <p:style>
+          <a:lnRef idx="2">
+            <a:schemeClr val="accent1">
+              <a:shade val="15000"/>
+            </a:schemeClr>
+          </a:lnRef>
+          <a:fillRef idx="1">
+            <a:schemeClr val="accent1"/>
+          </a:fillRef>
+          <a:effectRef idx="0">
+            <a:schemeClr val="accent1"/>
+          </a:effectRef>
+          <a:fontRef idx="minor">
+            <a:schemeClr val="lt1"/>
+          </a:fontRef>
+        </p:style>
+        <p:txBody>
+          <a:bodyPr rtlCol="0" anchor="ctr"/>
+          <a:lstStyle/>
+          <a:p>
+            <a:pPr marL="0" marR="0" lvl="0" indent="0" algn="ctr" defTabSz="914400" rtl="0" eaLnBrk="1" fontAlgn="auto" latinLnBrk="0" hangingPunct="1">
+              <a:lnSpc>
+                <a:spcPct val="100000"/>
+              </a:lnSpc>
+              <a:spcBef>
+                <a:spcPts val="0"/>
+              </a:spcBef>
+              <a:spcAft>
+                <a:spcPts val="0"/>
+              </a:spcAft>
+              <a:buClrTx/>
+              <a:buSzTx/>
+              <a:buFontTx/>
+              <a:buNone/>
+              <a:tabLst/>
+              <a:defRPr/>
+            </a:pPr>
+            <a:endParaRPr kumimoji="0" lang="en-DK" sz="1800" b="0" i="0" u="none" strike="noStrike" kern="1200" cap="none" spc="0" normalizeH="0" baseline="0" noProof="0">
+              <a:ln>
+                <a:noFill/>
+              </a:ln>
+              <a:solidFill>
+                <a:prstClr val="white"/>
+              </a:solidFill>
+              <a:effectLst/>
+              <a:uLnTx/>
+              <a:uFillTx/>
+              <a:latin typeface="Calibri" panose="020F0502020204030204"/>
+              <a:ea typeface="+mn-ea"/>
+              <a:cs typeface="+mn-cs"/>
+            </a:endParaRPr>
+          </a:p>
+        </p:txBody>
+      </p:sp>
+      <p:sp>
+        <p:nvSpPr>
+          <p:cNvPr id="13" name="Arrow: Right 12">
+            <a:extLst>
+              <a:ext uri="{FF2B5EF4-FFF2-40B4-BE49-F238E27FC236}">
+                <a16:creationId xmlns:a16="http://schemas.microsoft.com/office/drawing/2014/main" id="{20CE4861-313F-AB46-9B29-5DB8829399B3}"/>
+              </a:ext>
+            </a:extLst>
+          </p:cNvPr>
+          <p:cNvSpPr/>
+          <p:nvPr/>
+        </p:nvSpPr>
+        <p:spPr>
+          <a:xfrm>
+            <a:off x="5783769" y="2798954"/>
+            <a:ext cx="490653" cy="412595"/>
+          </a:xfrm>
+          <a:prstGeom prst="rightArrow">
+            <a:avLst/>
+          </a:prstGeom>
+          <a:solidFill>
+            <a:schemeClr val="tx1"/>
+          </a:solidFill>
+          <a:ln>
+            <a:solidFill>
+              <a:schemeClr val="tx1"/>
+            </a:solidFill>
+          </a:ln>
+        </p:spPr>
+        <p:style>
+          <a:lnRef idx="2">
+            <a:schemeClr val="accent1">
+              <a:shade val="15000"/>
+            </a:schemeClr>
+          </a:lnRef>
+          <a:fillRef idx="1">
+            <a:schemeClr val="accent1"/>
+          </a:fillRef>
+          <a:effectRef idx="0">
+            <a:schemeClr val="accent1"/>
+          </a:effectRef>
+          <a:fontRef idx="minor">
+            <a:schemeClr val="lt1"/>
+          </a:fontRef>
+        </p:style>
+        <p:txBody>
+          <a:bodyPr rtlCol="0" anchor="ctr"/>
+          <a:lstStyle/>
+          <a:p>
+            <a:pPr marL="0" marR="0" lvl="0" indent="0" algn="ctr" defTabSz="914400" rtl="0" eaLnBrk="1" fontAlgn="auto" latinLnBrk="0" hangingPunct="1">
+              <a:lnSpc>
+                <a:spcPct val="100000"/>
+              </a:lnSpc>
+              <a:spcBef>
+                <a:spcPts val="0"/>
+              </a:spcBef>
+              <a:spcAft>
+                <a:spcPts val="0"/>
+              </a:spcAft>
+              <a:buClrTx/>
+              <a:buSzTx/>
+              <a:buFontTx/>
+              <a:buNone/>
+              <a:tabLst/>
+              <a:defRPr/>
+            </a:pPr>
+            <a:endParaRPr kumimoji="0" lang="en-DK" sz="1800" b="0" i="0" u="none" strike="noStrike" kern="1200" cap="none" spc="0" normalizeH="0" baseline="0" noProof="0">
+              <a:ln>
+                <a:noFill/>
+              </a:ln>
+              <a:solidFill>
+                <a:prstClr val="white"/>
+              </a:solidFill>
+              <a:effectLst/>
+              <a:uLnTx/>
+              <a:uFillTx/>
+              <a:latin typeface="Calibri" panose="020F0502020204030204"/>
+              <a:ea typeface="+mn-ea"/>
+              <a:cs typeface="+mn-cs"/>
+            </a:endParaRPr>
+          </a:p>
+        </p:txBody>
+      </p:sp>
+      <p:sp>
+        <p:nvSpPr>
+          <p:cNvPr id="14" name="Arrow: Right 13">
+            <a:extLst>
+              <a:ext uri="{FF2B5EF4-FFF2-40B4-BE49-F238E27FC236}">
+                <a16:creationId xmlns:a16="http://schemas.microsoft.com/office/drawing/2014/main" id="{96442030-E615-0B6E-5498-1DE51863530F}"/>
+              </a:ext>
+            </a:extLst>
+          </p:cNvPr>
+          <p:cNvSpPr/>
+          <p:nvPr/>
+        </p:nvSpPr>
+        <p:spPr>
+          <a:xfrm>
+            <a:off x="8376429" y="2798953"/>
+            <a:ext cx="490653" cy="412595"/>
+          </a:xfrm>
+          <a:prstGeom prst="rightArrow">
+            <a:avLst/>
+          </a:prstGeom>
+          <a:solidFill>
+            <a:schemeClr val="tx1"/>
+          </a:solidFill>
+          <a:ln>
+            <a:solidFill>
+              <a:schemeClr val="tx1"/>
+            </a:solidFill>
+          </a:ln>
+        </p:spPr>
+        <p:style>
+          <a:lnRef idx="2">
+            <a:schemeClr val="accent1">
+              <a:shade val="15000"/>
+            </a:schemeClr>
+          </a:lnRef>
+          <a:fillRef idx="1">
+            <a:schemeClr val="accent1"/>
+          </a:fillRef>
+          <a:effectRef idx="0">
+            <a:schemeClr val="accent1"/>
+          </a:effectRef>
+          <a:fontRef idx="minor">
+            <a:schemeClr val="lt1"/>
+          </a:fontRef>
+        </p:style>
+        <p:txBody>
+          <a:bodyPr rtlCol="0" anchor="ctr"/>
+          <a:lstStyle/>
+          <a:p>
+            <a:pPr marL="0" marR="0" lvl="0" indent="0" algn="ctr" defTabSz="914400" rtl="0" eaLnBrk="1" fontAlgn="auto" latinLnBrk="0" hangingPunct="1">
+              <a:lnSpc>
+                <a:spcPct val="100000"/>
+              </a:lnSpc>
+              <a:spcBef>
+                <a:spcPts val="0"/>
+              </a:spcBef>
+              <a:spcAft>
+                <a:spcPts val="0"/>
+              </a:spcAft>
+              <a:buClrTx/>
+              <a:buSzTx/>
+              <a:buFontTx/>
+              <a:buNone/>
+              <a:tabLst/>
+              <a:defRPr/>
+            </a:pPr>
+            <a:endParaRPr kumimoji="0" lang="en-DK" sz="1800" b="0" i="0" u="none" strike="noStrike" kern="1200" cap="none" spc="0" normalizeH="0" baseline="0" noProof="0">
+              <a:ln>
+                <a:noFill/>
+              </a:ln>
+              <a:solidFill>
+                <a:prstClr val="white"/>
+              </a:solidFill>
+              <a:effectLst/>
+              <a:uLnTx/>
+              <a:uFillTx/>
+              <a:latin typeface="Calibri" panose="020F0502020204030204"/>
+              <a:ea typeface="+mn-ea"/>
+              <a:cs typeface="+mn-cs"/>
+            </a:endParaRPr>
+          </a:p>
+        </p:txBody>
+      </p:sp>
+    </p:spTree>
+    <p:extLst>
+      <p:ext uri="{BB962C8B-B14F-4D97-AF65-F5344CB8AC3E}">
+        <p14:creationId xmlns:p14="http://schemas.microsoft.com/office/powerpoint/2010/main" val="4181428912"/>
+      </p:ext>
+    </p:extLst>
+  </p:cSld>
+  <p:clrMapOvr>
+    <a:masterClrMapping/>
+  </p:clrMapOvr>
+</p:sld>
+</file>
+
 <file path=ppt/slides/slide2.xml><?xml version="1.0" encoding="utf-8"?>
 <p:sld xmlns:a="http://schemas.openxmlformats.org/drawingml/2006/main" xmlns:r="http://schemas.openxmlformats.org/officeDocument/2006/relationships" xmlns:p="http://schemas.openxmlformats.org/presentationml/2006/main">
   <p:cSld>
@@ -4333,10 +7544,10 @@
       </p:grpSpPr>
       <p:pic>
         <p:nvPicPr>
-          <p:cNvPr id="3" name="Picture 2">
-            <a:extLst>
-              <a:ext uri="{FF2B5EF4-FFF2-40B4-BE49-F238E27FC236}">
-                <a16:creationId xmlns:a16="http://schemas.microsoft.com/office/drawing/2014/main" id="{A0E20B21-11BC-7DE1-9EF7-7F32EF0DEEA3}"/>
+          <p:cNvPr id="15" name="Picture 14">
+            <a:extLst>
+              <a:ext uri="{FF2B5EF4-FFF2-40B4-BE49-F238E27FC236}">
+                <a16:creationId xmlns:a16="http://schemas.microsoft.com/office/drawing/2014/main" id="{9263F7C4-BC14-E4B3-9809-2BD202D340AB}"/>
               </a:ext>
             </a:extLst>
           </p:cNvPr>
@@ -4353,8 +7564,8 @@
         </p:blipFill>
         <p:spPr>
           <a:xfrm>
-            <a:off x="3676312" y="1618997"/>
-            <a:ext cx="4839375" cy="3620005"/>
+            <a:off x="2071127" y="1980998"/>
+            <a:ext cx="8005263" cy="2880000"/>
           </a:xfrm>
           <a:prstGeom prst="rect">
             <a:avLst/>
@@ -4365,6 +7576,732 @@
     <p:extLst>
       <p:ext uri="{BB962C8B-B14F-4D97-AF65-F5344CB8AC3E}">
         <p14:creationId xmlns:p14="http://schemas.microsoft.com/office/powerpoint/2010/main" val="4064126254"/>
+      </p:ext>
+    </p:extLst>
+  </p:cSld>
+  <p:clrMapOvr>
+    <a:masterClrMapping/>
+  </p:clrMapOvr>
+</p:sld>
+</file>
+
+<file path=ppt/slides/slide3.xml><?xml version="1.0" encoding="utf-8"?>
+<p:sld xmlns:a="http://schemas.openxmlformats.org/drawingml/2006/main" xmlns:r="http://schemas.openxmlformats.org/officeDocument/2006/relationships" xmlns:p="http://schemas.openxmlformats.org/presentationml/2006/main">
+  <p:cSld>
+    <p:spTree>
+      <p:nvGrpSpPr>
+        <p:cNvPr id="1" name=""/>
+        <p:cNvGrpSpPr/>
+        <p:nvPr/>
+      </p:nvGrpSpPr>
+      <p:grpSpPr>
+        <a:xfrm>
+          <a:off x="0" y="0"/>
+          <a:ext cx="0" cy="0"/>
+          <a:chOff x="0" y="0"/>
+          <a:chExt cx="0" cy="0"/>
+        </a:xfrm>
+      </p:grpSpPr>
+      <p:pic>
+        <p:nvPicPr>
+          <p:cNvPr id="5" name="Picture 4">
+            <a:extLst>
+              <a:ext uri="{FF2B5EF4-FFF2-40B4-BE49-F238E27FC236}">
+                <a16:creationId xmlns:a16="http://schemas.microsoft.com/office/drawing/2014/main" id="{1D109D47-5E23-0615-96E3-699A3FC089E2}"/>
+              </a:ext>
+            </a:extLst>
+          </p:cNvPr>
+          <p:cNvPicPr>
+            <a:picLocks noChangeAspect="1"/>
+          </p:cNvPicPr>
+          <p:nvPr/>
+        </p:nvPicPr>
+        <p:blipFill>
+          <a:blip r:embed="rId3"/>
+          <a:stretch>
+            <a:fillRect/>
+          </a:stretch>
+        </p:blipFill>
+        <p:spPr>
+          <a:xfrm>
+            <a:off x="2061599" y="1980998"/>
+            <a:ext cx="8024211" cy="2880000"/>
+          </a:xfrm>
+          <a:prstGeom prst="rect">
+            <a:avLst/>
+          </a:prstGeom>
+        </p:spPr>
+      </p:pic>
+    </p:spTree>
+    <p:extLst>
+      <p:ext uri="{BB962C8B-B14F-4D97-AF65-F5344CB8AC3E}">
+        <p14:creationId xmlns:p14="http://schemas.microsoft.com/office/powerpoint/2010/main" val="1713241584"/>
+      </p:ext>
+    </p:extLst>
+  </p:cSld>
+  <p:clrMapOvr>
+    <a:masterClrMapping/>
+  </p:clrMapOvr>
+</p:sld>
+</file>
+
+<file path=ppt/slides/slide4.xml><?xml version="1.0" encoding="utf-8"?>
+<p:sld xmlns:a="http://schemas.openxmlformats.org/drawingml/2006/main" xmlns:r="http://schemas.openxmlformats.org/officeDocument/2006/relationships" xmlns:p="http://schemas.openxmlformats.org/presentationml/2006/main">
+  <p:cSld>
+    <p:spTree>
+      <p:nvGrpSpPr>
+        <p:cNvPr id="1" name=""/>
+        <p:cNvGrpSpPr/>
+        <p:nvPr/>
+      </p:nvGrpSpPr>
+      <p:grpSpPr>
+        <a:xfrm>
+          <a:off x="0" y="0"/>
+          <a:ext cx="0" cy="0"/>
+          <a:chOff x="0" y="0"/>
+          <a:chExt cx="0" cy="0"/>
+        </a:xfrm>
+      </p:grpSpPr>
+      <p:pic>
+        <p:nvPicPr>
+          <p:cNvPr id="13" name="Picture 12">
+            <a:extLst>
+              <a:ext uri="{FF2B5EF4-FFF2-40B4-BE49-F238E27FC236}">
+                <a16:creationId xmlns:a16="http://schemas.microsoft.com/office/drawing/2014/main" id="{7380459A-3719-EB89-19D3-EE394D9A4F3D}"/>
+              </a:ext>
+            </a:extLst>
+          </p:cNvPr>
+          <p:cNvPicPr>
+            <a:picLocks noChangeAspect="1"/>
+          </p:cNvPicPr>
+          <p:nvPr/>
+        </p:nvPicPr>
+        <p:blipFill>
+          <a:blip r:embed="rId3"/>
+          <a:stretch>
+            <a:fillRect/>
+          </a:stretch>
+        </p:blipFill>
+        <p:spPr>
+          <a:xfrm>
+            <a:off x="2042548" y="1980998"/>
+            <a:ext cx="8062105" cy="2880000"/>
+          </a:xfrm>
+          <a:prstGeom prst="rect">
+            <a:avLst/>
+          </a:prstGeom>
+        </p:spPr>
+      </p:pic>
+    </p:spTree>
+    <p:extLst>
+      <p:ext uri="{BB962C8B-B14F-4D97-AF65-F5344CB8AC3E}">
+        <p14:creationId xmlns:p14="http://schemas.microsoft.com/office/powerpoint/2010/main" val="1364812898"/>
+      </p:ext>
+    </p:extLst>
+  </p:cSld>
+  <p:clrMapOvr>
+    <a:masterClrMapping/>
+  </p:clrMapOvr>
+</p:sld>
+</file>
+
+<file path=ppt/slides/slide5.xml><?xml version="1.0" encoding="utf-8"?>
+<p:sld xmlns:a="http://schemas.openxmlformats.org/drawingml/2006/main" xmlns:r="http://schemas.openxmlformats.org/officeDocument/2006/relationships" xmlns:p="http://schemas.openxmlformats.org/presentationml/2006/main">
+  <p:cSld>
+    <p:spTree>
+      <p:nvGrpSpPr>
+        <p:cNvPr id="1" name=""/>
+        <p:cNvGrpSpPr/>
+        <p:nvPr/>
+      </p:nvGrpSpPr>
+      <p:grpSpPr>
+        <a:xfrm>
+          <a:off x="0" y="0"/>
+          <a:ext cx="0" cy="0"/>
+          <a:chOff x="0" y="0"/>
+          <a:chExt cx="0" cy="0"/>
+        </a:xfrm>
+      </p:grpSpPr>
+      <p:pic>
+        <p:nvPicPr>
+          <p:cNvPr id="3" name="Picture 2">
+            <a:extLst>
+              <a:ext uri="{FF2B5EF4-FFF2-40B4-BE49-F238E27FC236}">
+                <a16:creationId xmlns:a16="http://schemas.microsoft.com/office/drawing/2014/main" id="{3B067071-FA3D-0179-F557-4A2DA8EBAB1A}"/>
+              </a:ext>
+            </a:extLst>
+          </p:cNvPr>
+          <p:cNvPicPr>
+            <a:picLocks noChangeAspect="1"/>
+          </p:cNvPicPr>
+          <p:nvPr/>
+        </p:nvPicPr>
+        <p:blipFill>
+          <a:blip r:embed="rId3"/>
+          <a:stretch>
+            <a:fillRect/>
+          </a:stretch>
+        </p:blipFill>
+        <p:spPr>
+          <a:xfrm>
+            <a:off x="840930" y="1989000"/>
+            <a:ext cx="4785117" cy="2880000"/>
+          </a:xfrm>
+          <a:prstGeom prst="rect">
+            <a:avLst/>
+          </a:prstGeom>
+        </p:spPr>
+      </p:pic>
+      <p:pic>
+        <p:nvPicPr>
+          <p:cNvPr id="5" name="Picture 4">
+            <a:extLst>
+              <a:ext uri="{FF2B5EF4-FFF2-40B4-BE49-F238E27FC236}">
+                <a16:creationId xmlns:a16="http://schemas.microsoft.com/office/drawing/2014/main" id="{1C7DC8EA-B991-A71C-99CA-26E372543962}"/>
+              </a:ext>
+            </a:extLst>
+          </p:cNvPr>
+          <p:cNvPicPr>
+            <a:picLocks noChangeAspect="1"/>
+          </p:cNvPicPr>
+          <p:nvPr/>
+        </p:nvPicPr>
+        <p:blipFill>
+          <a:blip r:embed="rId4"/>
+          <a:stretch>
+            <a:fillRect/>
+          </a:stretch>
+        </p:blipFill>
+        <p:spPr>
+          <a:xfrm>
+            <a:off x="5996875" y="1989000"/>
+            <a:ext cx="5358140" cy="2880000"/>
+          </a:xfrm>
+          <a:prstGeom prst="rect">
+            <a:avLst/>
+          </a:prstGeom>
+        </p:spPr>
+      </p:pic>
+      <p:sp>
+        <p:nvSpPr>
+          <p:cNvPr id="6" name="TextBox 5">
+            <a:extLst>
+              <a:ext uri="{FF2B5EF4-FFF2-40B4-BE49-F238E27FC236}">
+                <a16:creationId xmlns:a16="http://schemas.microsoft.com/office/drawing/2014/main" id="{BB9B2773-1260-8B62-1093-F51D8F40E450}"/>
+              </a:ext>
+            </a:extLst>
+          </p:cNvPr>
+          <p:cNvSpPr txBox="1"/>
+          <p:nvPr/>
+        </p:nvSpPr>
+        <p:spPr>
+          <a:xfrm>
+            <a:off x="840930" y="1410159"/>
+            <a:ext cx="455574" cy="461665"/>
+          </a:xfrm>
+          <a:prstGeom prst="rect">
+            <a:avLst/>
+          </a:prstGeom>
+          <a:noFill/>
+        </p:spPr>
+        <p:txBody>
+          <a:bodyPr wrap="none" rtlCol="0">
+            <a:spAutoFit/>
+          </a:bodyPr>
+          <a:lstStyle/>
+          <a:p>
+            <a:r>
+              <a:rPr lang="en-US" sz="2400" dirty="0"/>
+              <a:t>A)</a:t>
+            </a:r>
+            <a:endParaRPr lang="en-DK" sz="2400" dirty="0"/>
+          </a:p>
+        </p:txBody>
+      </p:sp>
+      <p:sp>
+        <p:nvSpPr>
+          <p:cNvPr id="7" name="TextBox 6">
+            <a:extLst>
+              <a:ext uri="{FF2B5EF4-FFF2-40B4-BE49-F238E27FC236}">
+                <a16:creationId xmlns:a16="http://schemas.microsoft.com/office/drawing/2014/main" id="{B79F8DDF-0F98-67FA-669B-8A56E320F7CF}"/>
+              </a:ext>
+            </a:extLst>
+          </p:cNvPr>
+          <p:cNvSpPr txBox="1"/>
+          <p:nvPr/>
+        </p:nvSpPr>
+        <p:spPr>
+          <a:xfrm>
+            <a:off x="5886705" y="1410158"/>
+            <a:ext cx="460382" cy="461665"/>
+          </a:xfrm>
+          <a:prstGeom prst="rect">
+            <a:avLst/>
+          </a:prstGeom>
+          <a:noFill/>
+        </p:spPr>
+        <p:txBody>
+          <a:bodyPr wrap="none" rtlCol="0">
+            <a:spAutoFit/>
+          </a:bodyPr>
+          <a:lstStyle/>
+          <a:p>
+            <a:r>
+              <a:rPr lang="en-US" sz="2400" dirty="0"/>
+              <a:t>B)</a:t>
+            </a:r>
+            <a:endParaRPr lang="en-DK" sz="2400" dirty="0"/>
+          </a:p>
+        </p:txBody>
+      </p:sp>
+    </p:spTree>
+    <p:extLst>
+      <p:ext uri="{BB962C8B-B14F-4D97-AF65-F5344CB8AC3E}">
+        <p14:creationId xmlns:p14="http://schemas.microsoft.com/office/powerpoint/2010/main" val="2238735777"/>
+      </p:ext>
+    </p:extLst>
+  </p:cSld>
+  <p:clrMapOvr>
+    <a:masterClrMapping/>
+  </p:clrMapOvr>
+</p:sld>
+</file>
+
+<file path=ppt/slides/slide6.xml><?xml version="1.0" encoding="utf-8"?>
+<p:sld xmlns:a="http://schemas.openxmlformats.org/drawingml/2006/main" xmlns:r="http://schemas.openxmlformats.org/officeDocument/2006/relationships" xmlns:p="http://schemas.openxmlformats.org/presentationml/2006/main">
+  <p:cSld>
+    <p:spTree>
+      <p:nvGrpSpPr>
+        <p:cNvPr id="1" name=""/>
+        <p:cNvGrpSpPr/>
+        <p:nvPr/>
+      </p:nvGrpSpPr>
+      <p:grpSpPr>
+        <a:xfrm>
+          <a:off x="0" y="0"/>
+          <a:ext cx="0" cy="0"/>
+          <a:chOff x="0" y="0"/>
+          <a:chExt cx="0" cy="0"/>
+        </a:xfrm>
+      </p:grpSpPr>
+      <p:pic>
+        <p:nvPicPr>
+          <p:cNvPr id="5" name="Picture 4">
+            <a:extLst>
+              <a:ext uri="{FF2B5EF4-FFF2-40B4-BE49-F238E27FC236}">
+                <a16:creationId xmlns:a16="http://schemas.microsoft.com/office/drawing/2014/main" id="{CE99D532-0D1E-70C0-8303-C79EFBB55800}"/>
+              </a:ext>
+            </a:extLst>
+          </p:cNvPr>
+          <p:cNvPicPr>
+            <a:picLocks noChangeAspect="1"/>
+          </p:cNvPicPr>
+          <p:nvPr/>
+        </p:nvPicPr>
+        <p:blipFill>
+          <a:blip r:embed="rId3"/>
+          <a:stretch>
+            <a:fillRect/>
+          </a:stretch>
+        </p:blipFill>
+        <p:spPr>
+          <a:xfrm>
+            <a:off x="3708245" y="1989000"/>
+            <a:ext cx="4775510" cy="2880000"/>
+          </a:xfrm>
+          <a:prstGeom prst="rect">
+            <a:avLst/>
+          </a:prstGeom>
+        </p:spPr>
+      </p:pic>
+    </p:spTree>
+    <p:extLst>
+      <p:ext uri="{BB962C8B-B14F-4D97-AF65-F5344CB8AC3E}">
+        <p14:creationId xmlns:p14="http://schemas.microsoft.com/office/powerpoint/2010/main" val="343486341"/>
+      </p:ext>
+    </p:extLst>
+  </p:cSld>
+  <p:clrMapOvr>
+    <a:masterClrMapping/>
+  </p:clrMapOvr>
+</p:sld>
+</file>
+
+<file path=ppt/slides/slide7.xml><?xml version="1.0" encoding="utf-8"?>
+<p:sld xmlns:a="http://schemas.openxmlformats.org/drawingml/2006/main" xmlns:r="http://schemas.openxmlformats.org/officeDocument/2006/relationships" xmlns:p="http://schemas.openxmlformats.org/presentationml/2006/main">
+  <p:cSld>
+    <p:spTree>
+      <p:nvGrpSpPr>
+        <p:cNvPr id="1" name=""/>
+        <p:cNvGrpSpPr/>
+        <p:nvPr/>
+      </p:nvGrpSpPr>
+      <p:grpSpPr>
+        <a:xfrm>
+          <a:off x="0" y="0"/>
+          <a:ext cx="0" cy="0"/>
+          <a:chOff x="0" y="0"/>
+          <a:chExt cx="0" cy="0"/>
+        </a:xfrm>
+      </p:grpSpPr>
+      <p:pic>
+        <p:nvPicPr>
+          <p:cNvPr id="3" name="Picture 2">
+            <a:extLst>
+              <a:ext uri="{FF2B5EF4-FFF2-40B4-BE49-F238E27FC236}">
+                <a16:creationId xmlns:a16="http://schemas.microsoft.com/office/drawing/2014/main" id="{AE82D32A-7F1A-EB1C-CABA-BE7E33EBCBFA}"/>
+              </a:ext>
+            </a:extLst>
+          </p:cNvPr>
+          <p:cNvPicPr>
+            <a:picLocks noChangeAspect="1"/>
+          </p:cNvPicPr>
+          <p:nvPr/>
+        </p:nvPicPr>
+        <p:blipFill>
+          <a:blip r:embed="rId3"/>
+          <a:stretch>
+            <a:fillRect/>
+          </a:stretch>
+        </p:blipFill>
+        <p:spPr>
+          <a:xfrm>
+            <a:off x="1355359" y="2161373"/>
+            <a:ext cx="3924528" cy="2880000"/>
+          </a:xfrm>
+          <a:prstGeom prst="rect">
+            <a:avLst/>
+          </a:prstGeom>
+        </p:spPr>
+      </p:pic>
+      <p:pic>
+        <p:nvPicPr>
+          <p:cNvPr id="5" name="Picture 4">
+            <a:extLst>
+              <a:ext uri="{FF2B5EF4-FFF2-40B4-BE49-F238E27FC236}">
+                <a16:creationId xmlns:a16="http://schemas.microsoft.com/office/drawing/2014/main" id="{ED7D6028-BBA8-6BE2-EE41-78E02923F60A}"/>
+              </a:ext>
+            </a:extLst>
+          </p:cNvPr>
+          <p:cNvPicPr>
+            <a:picLocks noChangeAspect="1"/>
+          </p:cNvPicPr>
+          <p:nvPr/>
+        </p:nvPicPr>
+        <p:blipFill>
+          <a:blip r:embed="rId4"/>
+          <a:stretch>
+            <a:fillRect/>
+          </a:stretch>
+        </p:blipFill>
+        <p:spPr>
+          <a:xfrm>
+            <a:off x="5478501" y="2161373"/>
+            <a:ext cx="5358140" cy="2880000"/>
+          </a:xfrm>
+          <a:prstGeom prst="rect">
+            <a:avLst/>
+          </a:prstGeom>
+        </p:spPr>
+      </p:pic>
+      <p:sp>
+        <p:nvSpPr>
+          <p:cNvPr id="6" name="TextBox 5">
+            <a:extLst>
+              <a:ext uri="{FF2B5EF4-FFF2-40B4-BE49-F238E27FC236}">
+                <a16:creationId xmlns:a16="http://schemas.microsoft.com/office/drawing/2014/main" id="{23228ABE-73C7-5456-EBAD-84AC2F9C8F1F}"/>
+              </a:ext>
+            </a:extLst>
+          </p:cNvPr>
+          <p:cNvSpPr txBox="1"/>
+          <p:nvPr/>
+        </p:nvSpPr>
+        <p:spPr>
+          <a:xfrm>
+            <a:off x="1355359" y="1640990"/>
+            <a:ext cx="455574" cy="461665"/>
+          </a:xfrm>
+          <a:prstGeom prst="rect">
+            <a:avLst/>
+          </a:prstGeom>
+          <a:noFill/>
+        </p:spPr>
+        <p:txBody>
+          <a:bodyPr wrap="none" rtlCol="0">
+            <a:spAutoFit/>
+          </a:bodyPr>
+          <a:lstStyle/>
+          <a:p>
+            <a:r>
+              <a:rPr lang="en-US" sz="2400" dirty="0"/>
+              <a:t>A)</a:t>
+            </a:r>
+            <a:endParaRPr lang="en-DK" sz="2400" dirty="0"/>
+          </a:p>
+        </p:txBody>
+      </p:sp>
+      <p:sp>
+        <p:nvSpPr>
+          <p:cNvPr id="7" name="TextBox 6">
+            <a:extLst>
+              <a:ext uri="{FF2B5EF4-FFF2-40B4-BE49-F238E27FC236}">
+                <a16:creationId xmlns:a16="http://schemas.microsoft.com/office/drawing/2014/main" id="{161C46CE-4F9E-0071-542B-B3C8CFC7342C}"/>
+              </a:ext>
+            </a:extLst>
+          </p:cNvPr>
+          <p:cNvSpPr txBox="1"/>
+          <p:nvPr/>
+        </p:nvSpPr>
+        <p:spPr>
+          <a:xfrm>
+            <a:off x="5416072" y="1640989"/>
+            <a:ext cx="460382" cy="461665"/>
+          </a:xfrm>
+          <a:prstGeom prst="rect">
+            <a:avLst/>
+          </a:prstGeom>
+          <a:noFill/>
+        </p:spPr>
+        <p:txBody>
+          <a:bodyPr wrap="none" rtlCol="0">
+            <a:spAutoFit/>
+          </a:bodyPr>
+          <a:lstStyle/>
+          <a:p>
+            <a:r>
+              <a:rPr lang="en-US" sz="2400" dirty="0"/>
+              <a:t>B)</a:t>
+            </a:r>
+            <a:endParaRPr lang="en-DK" sz="2400" dirty="0"/>
+          </a:p>
+        </p:txBody>
+      </p:sp>
+    </p:spTree>
+    <p:extLst>
+      <p:ext uri="{BB962C8B-B14F-4D97-AF65-F5344CB8AC3E}">
+        <p14:creationId xmlns:p14="http://schemas.microsoft.com/office/powerpoint/2010/main" val="1013029507"/>
+      </p:ext>
+    </p:extLst>
+  </p:cSld>
+  <p:clrMapOvr>
+    <a:masterClrMapping/>
+  </p:clrMapOvr>
+</p:sld>
+</file>
+
+<file path=ppt/slides/slide8.xml><?xml version="1.0" encoding="utf-8"?>
+<p:sld xmlns:a="http://schemas.openxmlformats.org/drawingml/2006/main" xmlns:r="http://schemas.openxmlformats.org/officeDocument/2006/relationships" xmlns:p="http://schemas.openxmlformats.org/presentationml/2006/main">
+  <p:cSld>
+    <p:spTree>
+      <p:nvGrpSpPr>
+        <p:cNvPr id="1" name=""/>
+        <p:cNvGrpSpPr/>
+        <p:nvPr/>
+      </p:nvGrpSpPr>
+      <p:grpSpPr>
+        <a:xfrm>
+          <a:off x="0" y="0"/>
+          <a:ext cx="0" cy="0"/>
+          <a:chOff x="0" y="0"/>
+          <a:chExt cx="0" cy="0"/>
+        </a:xfrm>
+      </p:grpSpPr>
+      <p:pic>
+        <p:nvPicPr>
+          <p:cNvPr id="3" name="Picture 2">
+            <a:extLst>
+              <a:ext uri="{FF2B5EF4-FFF2-40B4-BE49-F238E27FC236}">
+                <a16:creationId xmlns:a16="http://schemas.microsoft.com/office/drawing/2014/main" id="{5D178909-068B-B352-C2BC-712ABC226455}"/>
+              </a:ext>
+            </a:extLst>
+          </p:cNvPr>
+          <p:cNvPicPr>
+            <a:picLocks noChangeAspect="1"/>
+          </p:cNvPicPr>
+          <p:nvPr/>
+        </p:nvPicPr>
+        <p:blipFill>
+          <a:blip r:embed="rId3"/>
+          <a:stretch>
+            <a:fillRect/>
+          </a:stretch>
+        </p:blipFill>
+        <p:spPr>
+          <a:xfrm>
+            <a:off x="3036073" y="1865548"/>
+            <a:ext cx="5606108" cy="2880000"/>
+          </a:xfrm>
+          <a:prstGeom prst="rect">
+            <a:avLst/>
+          </a:prstGeom>
+        </p:spPr>
+      </p:pic>
+    </p:spTree>
+    <p:extLst>
+      <p:ext uri="{BB962C8B-B14F-4D97-AF65-F5344CB8AC3E}">
+        <p14:creationId xmlns:p14="http://schemas.microsoft.com/office/powerpoint/2010/main" val="3448695614"/>
+      </p:ext>
+    </p:extLst>
+  </p:cSld>
+  <p:clrMapOvr>
+    <a:masterClrMapping/>
+  </p:clrMapOvr>
+</p:sld>
+</file>
+
+<file path=ppt/slides/slide9.xml><?xml version="1.0" encoding="utf-8"?>
+<p:sld xmlns:a="http://schemas.openxmlformats.org/drawingml/2006/main" xmlns:r="http://schemas.openxmlformats.org/officeDocument/2006/relationships" xmlns:p="http://schemas.openxmlformats.org/presentationml/2006/main">
+  <p:cSld>
+    <p:spTree>
+      <p:nvGrpSpPr>
+        <p:cNvPr id="1" name=""/>
+        <p:cNvGrpSpPr/>
+        <p:nvPr/>
+      </p:nvGrpSpPr>
+      <p:grpSpPr>
+        <a:xfrm>
+          <a:off x="0" y="0"/>
+          <a:ext cx="0" cy="0"/>
+          <a:chOff x="0" y="0"/>
+          <a:chExt cx="0" cy="0"/>
+        </a:xfrm>
+      </p:grpSpPr>
+      <p:pic>
+        <p:nvPicPr>
+          <p:cNvPr id="3" name="Picture 2">
+            <a:extLst>
+              <a:ext uri="{FF2B5EF4-FFF2-40B4-BE49-F238E27FC236}">
+                <a16:creationId xmlns:a16="http://schemas.microsoft.com/office/drawing/2014/main" id="{8DF5251B-6AB3-63B6-A263-8C1CB226A785}"/>
+              </a:ext>
+            </a:extLst>
+          </p:cNvPr>
+          <p:cNvPicPr>
+            <a:picLocks noChangeAspect="1"/>
+          </p:cNvPicPr>
+          <p:nvPr/>
+        </p:nvPicPr>
+        <p:blipFill>
+          <a:blip r:embed="rId3"/>
+          <a:stretch>
+            <a:fillRect/>
+          </a:stretch>
+        </p:blipFill>
+        <p:spPr>
+          <a:xfrm>
+            <a:off x="1284584" y="2238114"/>
+            <a:ext cx="3890104" cy="2880000"/>
+          </a:xfrm>
+          <a:prstGeom prst="rect">
+            <a:avLst/>
+          </a:prstGeom>
+        </p:spPr>
+      </p:pic>
+      <p:pic>
+        <p:nvPicPr>
+          <p:cNvPr id="7" name="Picture 6">
+            <a:extLst>
+              <a:ext uri="{FF2B5EF4-FFF2-40B4-BE49-F238E27FC236}">
+                <a16:creationId xmlns:a16="http://schemas.microsoft.com/office/drawing/2014/main" id="{1792E858-5410-7277-4E2C-E3B7CCAC8F4E}"/>
+              </a:ext>
+            </a:extLst>
+          </p:cNvPr>
+          <p:cNvPicPr>
+            <a:picLocks noChangeAspect="1"/>
+          </p:cNvPicPr>
+          <p:nvPr/>
+        </p:nvPicPr>
+        <p:blipFill>
+          <a:blip r:embed="rId4"/>
+          <a:stretch>
+            <a:fillRect/>
+          </a:stretch>
+        </p:blipFill>
+        <p:spPr>
+          <a:xfrm>
+            <a:off x="5368617" y="2238114"/>
+            <a:ext cx="5358140" cy="2880000"/>
+          </a:xfrm>
+          <a:prstGeom prst="rect">
+            <a:avLst/>
+          </a:prstGeom>
+        </p:spPr>
+      </p:pic>
+      <p:sp>
+        <p:nvSpPr>
+          <p:cNvPr id="8" name="TextBox 7">
+            <a:extLst>
+              <a:ext uri="{FF2B5EF4-FFF2-40B4-BE49-F238E27FC236}">
+                <a16:creationId xmlns:a16="http://schemas.microsoft.com/office/drawing/2014/main" id="{49FF6EE8-DBAE-7042-C50E-A7BB0E73F713}"/>
+              </a:ext>
+            </a:extLst>
+          </p:cNvPr>
+          <p:cNvSpPr txBox="1"/>
+          <p:nvPr/>
+        </p:nvSpPr>
+        <p:spPr>
+          <a:xfrm>
+            <a:off x="1284584" y="1664714"/>
+            <a:ext cx="455574" cy="461665"/>
+          </a:xfrm>
+          <a:prstGeom prst="rect">
+            <a:avLst/>
+          </a:prstGeom>
+          <a:noFill/>
+        </p:spPr>
+        <p:txBody>
+          <a:bodyPr wrap="none" rtlCol="0">
+            <a:spAutoFit/>
+          </a:bodyPr>
+          <a:lstStyle/>
+          <a:p>
+            <a:r>
+              <a:rPr lang="en-US" sz="2400" dirty="0"/>
+              <a:t>A)</a:t>
+            </a:r>
+            <a:endParaRPr lang="en-DK" sz="2400" dirty="0"/>
+          </a:p>
+        </p:txBody>
+      </p:sp>
+      <p:sp>
+        <p:nvSpPr>
+          <p:cNvPr id="9" name="TextBox 8">
+            <a:extLst>
+              <a:ext uri="{FF2B5EF4-FFF2-40B4-BE49-F238E27FC236}">
+                <a16:creationId xmlns:a16="http://schemas.microsoft.com/office/drawing/2014/main" id="{B8C6A289-ADD3-902E-F8A6-A90E0FD06DDE}"/>
+              </a:ext>
+            </a:extLst>
+          </p:cNvPr>
+          <p:cNvSpPr txBox="1"/>
+          <p:nvPr/>
+        </p:nvSpPr>
+        <p:spPr>
+          <a:xfrm>
+            <a:off x="5372289" y="1664713"/>
+            <a:ext cx="460382" cy="461665"/>
+          </a:xfrm>
+          <a:prstGeom prst="rect">
+            <a:avLst/>
+          </a:prstGeom>
+          <a:noFill/>
+        </p:spPr>
+        <p:txBody>
+          <a:bodyPr wrap="none" rtlCol="0">
+            <a:spAutoFit/>
+          </a:bodyPr>
+          <a:lstStyle/>
+          <a:p>
+            <a:r>
+              <a:rPr lang="en-US" sz="2400" dirty="0"/>
+              <a:t>B)</a:t>
+            </a:r>
+            <a:endParaRPr lang="en-DK" sz="2400" dirty="0"/>
+          </a:p>
+        </p:txBody>
+      </p:sp>
+    </p:spTree>
+    <p:extLst>
+      <p:ext uri="{BB962C8B-B14F-4D97-AF65-F5344CB8AC3E}">
+        <p14:creationId xmlns:p14="http://schemas.microsoft.com/office/powerpoint/2010/main" val="1992554921"/>
       </p:ext>
     </p:extLst>
   </p:cSld>
@@ -4690,6 +8627,301 @@
 </file>
 
 <file path=ppt/theme/theme2.xml><?xml version="1.0" encoding="utf-8"?>
+<a:theme xmlns:a="http://schemas.openxmlformats.org/drawingml/2006/main" name="VisualStimuli">
+  <a:themeElements>
+    <a:clrScheme name="Office">
+      <a:dk1>
+        <a:sysClr val="windowText" lastClr="000000"/>
+      </a:dk1>
+      <a:lt1>
+        <a:sysClr val="window" lastClr="FFFFFF"/>
+      </a:lt1>
+      <a:dk2>
+        <a:srgbClr val="44546A"/>
+      </a:dk2>
+      <a:lt2>
+        <a:srgbClr val="E7E6E6"/>
+      </a:lt2>
+      <a:accent1>
+        <a:srgbClr val="4472C4"/>
+      </a:accent1>
+      <a:accent2>
+        <a:srgbClr val="ED7D31"/>
+      </a:accent2>
+      <a:accent3>
+        <a:srgbClr val="A5A5A5"/>
+      </a:accent3>
+      <a:accent4>
+        <a:srgbClr val="FFC000"/>
+      </a:accent4>
+      <a:accent5>
+        <a:srgbClr val="5B9BD5"/>
+      </a:accent5>
+      <a:accent6>
+        <a:srgbClr val="70AD47"/>
+      </a:accent6>
+      <a:hlink>
+        <a:srgbClr val="0563C1"/>
+      </a:hlink>
+      <a:folHlink>
+        <a:srgbClr val="954F72"/>
+      </a:folHlink>
+    </a:clrScheme>
+    <a:fontScheme name="Office">
+      <a:majorFont>
+        <a:latin typeface="Calibri Light" panose="020F0302020204030204"/>
+        <a:ea typeface=""/>
+        <a:cs typeface=""/>
+        <a:font script="Jpan" typeface="游ゴシック Light"/>
+        <a:font script="Hang" typeface="맑은 고딕"/>
+        <a:font script="Hans" typeface="等线 Light"/>
+        <a:font script="Hant" typeface="新細明體"/>
+        <a:font script="Arab" typeface="Times New Roman"/>
+        <a:font script="Hebr" typeface="Times New Roman"/>
+        <a:font script="Thai" typeface="Angsana New"/>
+        <a:font script="Ethi" typeface="Nyala"/>
+        <a:font script="Beng" typeface="Vrinda"/>
+        <a:font script="Gujr" typeface="Shruti"/>
+        <a:font script="Khmr" typeface="MoolBoran"/>
+        <a:font script="Knda" typeface="Tunga"/>
+        <a:font script="Guru" typeface="Raavi"/>
+        <a:font script="Cans" typeface="Euphemia"/>
+        <a:font script="Cher" typeface="Plantagenet Cherokee"/>
+        <a:font script="Yiii" typeface="Microsoft Yi Baiti"/>
+        <a:font script="Tibt" typeface="Microsoft Himalaya"/>
+        <a:font script="Thaa" typeface="MV Boli"/>
+        <a:font script="Deva" typeface="Mangal"/>
+        <a:font script="Telu" typeface="Gautami"/>
+        <a:font script="Taml" typeface="Latha"/>
+        <a:font script="Syrc" typeface="Estrangelo Edessa"/>
+        <a:font script="Orya" typeface="Kalinga"/>
+        <a:font script="Mlym" typeface="Kartika"/>
+        <a:font script="Laoo" typeface="DokChampa"/>
+        <a:font script="Sinh" typeface="Iskoola Pota"/>
+        <a:font script="Mong" typeface="Mongolian Baiti"/>
+        <a:font script="Viet" typeface="Times New Roman"/>
+        <a:font script="Uigh" typeface="Microsoft Uighur"/>
+        <a:font script="Geor" typeface="Sylfaen"/>
+        <a:font script="Armn" typeface="Arial"/>
+        <a:font script="Bugi" typeface="Leelawadee UI"/>
+        <a:font script="Bopo" typeface="Microsoft JhengHei"/>
+        <a:font script="Java" typeface="Javanese Text"/>
+        <a:font script="Lisu" typeface="Segoe UI"/>
+        <a:font script="Mymr" typeface="Myanmar Text"/>
+        <a:font script="Nkoo" typeface="Ebrima"/>
+        <a:font script="Olck" typeface="Nirmala UI"/>
+        <a:font script="Osma" typeface="Ebrima"/>
+        <a:font script="Phag" typeface="Phagspa"/>
+        <a:font script="Syrn" typeface="Estrangelo Edessa"/>
+        <a:font script="Syrj" typeface="Estrangelo Edessa"/>
+        <a:font script="Syre" typeface="Estrangelo Edessa"/>
+        <a:font script="Sora" typeface="Nirmala UI"/>
+        <a:font script="Tale" typeface="Microsoft Tai Le"/>
+        <a:font script="Talu" typeface="Microsoft New Tai Lue"/>
+        <a:font script="Tfng" typeface="Ebrima"/>
+      </a:majorFont>
+      <a:minorFont>
+        <a:latin typeface="Calibri" panose="020F0502020204030204"/>
+        <a:ea typeface=""/>
+        <a:cs typeface=""/>
+        <a:font script="Jpan" typeface="游ゴシック"/>
+        <a:font script="Hang" typeface="맑은 고딕"/>
+        <a:font script="Hans" typeface="等线"/>
+        <a:font script="Hant" typeface="新細明體"/>
+        <a:font script="Arab" typeface="Arial"/>
+        <a:font script="Hebr" typeface="Arial"/>
+        <a:font script="Thai" typeface="Cordia New"/>
+        <a:font script="Ethi" typeface="Nyala"/>
+        <a:font script="Beng" typeface="Vrinda"/>
+        <a:font script="Gujr" typeface="Shruti"/>
+        <a:font script="Khmr" typeface="DaunPenh"/>
+        <a:font script="Knda" typeface="Tunga"/>
+        <a:font script="Guru" typeface="Raavi"/>
+        <a:font script="Cans" typeface="Euphemia"/>
+        <a:font script="Cher" typeface="Plantagenet Cherokee"/>
+        <a:font script="Yiii" typeface="Microsoft Yi Baiti"/>
+        <a:font script="Tibt" typeface="Microsoft Himalaya"/>
+        <a:font script="Thaa" typeface="MV Boli"/>
+        <a:font script="Deva" typeface="Mangal"/>
+        <a:font script="Telu" typeface="Gautami"/>
+        <a:font script="Taml" typeface="Latha"/>
+        <a:font script="Syrc" typeface="Estrangelo Edessa"/>
+        <a:font script="Orya" typeface="Kalinga"/>
+        <a:font script="Mlym" typeface="Kartika"/>
+        <a:font script="Laoo" typeface="DokChampa"/>
+        <a:font script="Sinh" typeface="Iskoola Pota"/>
+        <a:font script="Mong" typeface="Mongolian Baiti"/>
+        <a:font script="Viet" typeface="Arial"/>
+        <a:font script="Uigh" typeface="Microsoft Uighur"/>
+        <a:font script="Geor" typeface="Sylfaen"/>
+        <a:font script="Armn" typeface="Arial"/>
+        <a:font script="Bugi" typeface="Leelawadee UI"/>
+        <a:font script="Bopo" typeface="Microsoft JhengHei"/>
+        <a:font script="Java" typeface="Javanese Text"/>
+        <a:font script="Lisu" typeface="Segoe UI"/>
+        <a:font script="Mymr" typeface="Myanmar Text"/>
+        <a:font script="Nkoo" typeface="Ebrima"/>
+        <a:font script="Olck" typeface="Nirmala UI"/>
+        <a:font script="Osma" typeface="Ebrima"/>
+        <a:font script="Phag" typeface="Phagspa"/>
+        <a:font script="Syrn" typeface="Estrangelo Edessa"/>
+        <a:font script="Syrj" typeface="Estrangelo Edessa"/>
+        <a:font script="Syre" typeface="Estrangelo Edessa"/>
+        <a:font script="Sora" typeface="Nirmala UI"/>
+        <a:font script="Tale" typeface="Microsoft Tai Le"/>
+        <a:font script="Talu" typeface="Microsoft New Tai Lue"/>
+        <a:font script="Tfng" typeface="Ebrima"/>
+      </a:minorFont>
+    </a:fontScheme>
+    <a:fmtScheme name="Office">
+      <a:fillStyleLst>
+        <a:solidFill>
+          <a:schemeClr val="phClr"/>
+        </a:solidFill>
+        <a:gradFill rotWithShape="1">
+          <a:gsLst>
+            <a:gs pos="0">
+              <a:schemeClr val="phClr">
+                <a:lumMod val="110000"/>
+                <a:satMod val="105000"/>
+                <a:tint val="67000"/>
+              </a:schemeClr>
+            </a:gs>
+            <a:gs pos="50000">
+              <a:schemeClr val="phClr">
+                <a:lumMod val="105000"/>
+                <a:satMod val="103000"/>
+                <a:tint val="73000"/>
+              </a:schemeClr>
+            </a:gs>
+            <a:gs pos="100000">
+              <a:schemeClr val="phClr">
+                <a:lumMod val="105000"/>
+                <a:satMod val="109000"/>
+                <a:tint val="81000"/>
+              </a:schemeClr>
+            </a:gs>
+          </a:gsLst>
+          <a:lin ang="5400000" scaled="0"/>
+        </a:gradFill>
+        <a:gradFill rotWithShape="1">
+          <a:gsLst>
+            <a:gs pos="0">
+              <a:schemeClr val="phClr">
+                <a:satMod val="103000"/>
+                <a:lumMod val="102000"/>
+                <a:tint val="94000"/>
+              </a:schemeClr>
+            </a:gs>
+            <a:gs pos="50000">
+              <a:schemeClr val="phClr">
+                <a:satMod val="110000"/>
+                <a:lumMod val="100000"/>
+                <a:shade val="100000"/>
+              </a:schemeClr>
+            </a:gs>
+            <a:gs pos="100000">
+              <a:schemeClr val="phClr">
+                <a:lumMod val="99000"/>
+                <a:satMod val="120000"/>
+                <a:shade val="78000"/>
+              </a:schemeClr>
+            </a:gs>
+          </a:gsLst>
+          <a:lin ang="5400000" scaled="0"/>
+        </a:gradFill>
+      </a:fillStyleLst>
+      <a:lnStyleLst>
+        <a:ln w="6350" cap="flat" cmpd="sng" algn="ctr">
+          <a:solidFill>
+            <a:schemeClr val="phClr"/>
+          </a:solidFill>
+          <a:prstDash val="solid"/>
+          <a:miter lim="800000"/>
+        </a:ln>
+        <a:ln w="12700" cap="flat" cmpd="sng" algn="ctr">
+          <a:solidFill>
+            <a:schemeClr val="phClr"/>
+          </a:solidFill>
+          <a:prstDash val="solid"/>
+          <a:miter lim="800000"/>
+        </a:ln>
+        <a:ln w="19050" cap="flat" cmpd="sng" algn="ctr">
+          <a:solidFill>
+            <a:schemeClr val="phClr"/>
+          </a:solidFill>
+          <a:prstDash val="solid"/>
+          <a:miter lim="800000"/>
+        </a:ln>
+      </a:lnStyleLst>
+      <a:effectStyleLst>
+        <a:effectStyle>
+          <a:effectLst/>
+        </a:effectStyle>
+        <a:effectStyle>
+          <a:effectLst/>
+        </a:effectStyle>
+        <a:effectStyle>
+          <a:effectLst>
+            <a:outerShdw blurRad="57150" dist="19050" dir="5400000" algn="ctr" rotWithShape="0">
+              <a:srgbClr val="000000">
+                <a:alpha val="63000"/>
+              </a:srgbClr>
+            </a:outerShdw>
+          </a:effectLst>
+        </a:effectStyle>
+      </a:effectStyleLst>
+      <a:bgFillStyleLst>
+        <a:solidFill>
+          <a:schemeClr val="phClr"/>
+        </a:solidFill>
+        <a:solidFill>
+          <a:schemeClr val="phClr">
+            <a:tint val="95000"/>
+            <a:satMod val="170000"/>
+          </a:schemeClr>
+        </a:solidFill>
+        <a:gradFill rotWithShape="1">
+          <a:gsLst>
+            <a:gs pos="0">
+              <a:schemeClr val="phClr">
+                <a:tint val="93000"/>
+                <a:satMod val="150000"/>
+                <a:shade val="98000"/>
+                <a:lumMod val="102000"/>
+              </a:schemeClr>
+            </a:gs>
+            <a:gs pos="50000">
+              <a:schemeClr val="phClr">
+                <a:tint val="98000"/>
+                <a:satMod val="130000"/>
+                <a:shade val="90000"/>
+                <a:lumMod val="103000"/>
+              </a:schemeClr>
+            </a:gs>
+            <a:gs pos="100000">
+              <a:schemeClr val="phClr">
+                <a:shade val="63000"/>
+                <a:satMod val="120000"/>
+              </a:schemeClr>
+            </a:gs>
+          </a:gsLst>
+          <a:lin ang="5400000" scaled="0"/>
+        </a:gradFill>
+      </a:bgFillStyleLst>
+    </a:fmtScheme>
+  </a:themeElements>
+  <a:objectDefaults/>
+  <a:extraClrSchemeLst/>
+  <a:extLst>
+    <a:ext uri="{05A4C25C-085E-4340-85A3-A5531E510DB2}">
+      <thm15:themeFamily xmlns:thm15="http://schemas.microsoft.com/office/thememl/2012/main" name="Office Theme" id="{62F939B6-93AF-4DB8-9C6B-D6C7DFDC589F}" vid="{4A3C46E8-61CC-4603-A589-7422A47A8E4A}"/>
+    </a:ext>
+  </a:extLst>
+</a:theme>
+</file>
+
+<file path=ppt/theme/theme3.xml><?xml version="1.0" encoding="utf-8"?>
 <a:theme xmlns:a="http://schemas.openxmlformats.org/drawingml/2006/main" name="Office Theme">
   <a:themeElements>
     <a:clrScheme name="Office">

</xml_diff>